<commit_message>
tech stack blockschaltbild farbe angepasst
</commit_message>
<xml_diff>
--- a/Busreservierungssystem für Vereinsfahrten3_2.pptx
+++ b/Busreservierungssystem für Vereinsfahrten3_2.pptx
@@ -6530,6 +6530,9 @@
           <a:prstGeom prst="rect">
             <a:avLst/>
           </a:prstGeom>
+          <a:solidFill>
+            <a:srgbClr val="00B0F0"/>
+          </a:solidFill>
         </p:spPr>
         <p:style>
           <a:lnRef idx="2">
@@ -6586,6 +6589,9 @@
           <a:prstGeom prst="rect">
             <a:avLst/>
           </a:prstGeom>
+          <a:solidFill>
+            <a:srgbClr val="00B0F0"/>
+          </a:solidFill>
         </p:spPr>
         <p:style>
           <a:lnRef idx="2">
@@ -6634,6 +6640,9 @@
           <a:prstGeom prst="rect">
             <a:avLst/>
           </a:prstGeom>
+          <a:solidFill>
+            <a:srgbClr val="00B0F0"/>
+          </a:solidFill>
         </p:spPr>
         <p:style>
           <a:lnRef idx="2">
@@ -6683,6 +6692,9 @@
           <a:prstGeom prst="rect">
             <a:avLst/>
           </a:prstGeom>
+          <a:solidFill>
+            <a:srgbClr val="00B0F0"/>
+          </a:solidFill>
         </p:spPr>
         <p:style>
           <a:lnRef idx="2">
@@ -6739,6 +6751,9 @@
           <a:prstGeom prst="rect">
             <a:avLst/>
           </a:prstGeom>
+          <a:solidFill>
+            <a:srgbClr val="00B0F0"/>
+          </a:solidFill>
         </p:spPr>
         <p:style>
           <a:lnRef idx="2">

</xml_diff>

<commit_message>
PowerPoint aktuallisiert und alter Versionen entfernt.
</commit_message>
<xml_diff>
--- a/Busreservierungssystem für Vereinsfahrten3_2.pptx
+++ b/Busreservierungssystem für Vereinsfahrten3_2.pptx
@@ -8,8 +8,10 @@
     <p:sldId id="256" r:id="rId2"/>
     <p:sldId id="259" r:id="rId3"/>
     <p:sldId id="258" r:id="rId4"/>
-    <p:sldId id="260" r:id="rId5"/>
-    <p:sldId id="257" r:id="rId6"/>
+    <p:sldId id="261" r:id="rId5"/>
+    <p:sldId id="260" r:id="rId6"/>
+    <p:sldId id="257" r:id="rId7"/>
+    <p:sldId id="262" r:id="rId8"/>
   </p:sldIdLst>
   <p:sldSz cx="12192000" cy="6858000"/>
   <p:notesSz cx="6858000" cy="9144000"/>
@@ -307,7 +309,7 @@
           <a:p>
             <a:fld id="{750F0EE5-0DCA-4955-91ED-88EFE3E19334}" type="datetimeFigureOut">
               <a:rPr lang="de-DE" smtClean="0"/>
-              <a:t>07.10.2025</a:t>
+              <a:t>08.10.2025</a:t>
             </a:fld>
             <a:endParaRPr lang="de-DE"/>
           </a:p>
@@ -743,7 +745,7 @@
           <a:p>
             <a:fld id="{750F0EE5-0DCA-4955-91ED-88EFE3E19334}" type="datetimeFigureOut">
               <a:rPr lang="de-DE" smtClean="0"/>
-              <a:t>07.10.2025</a:t>
+              <a:t>08.10.2025</a:t>
             </a:fld>
             <a:endParaRPr lang="de-DE"/>
           </a:p>
@@ -993,7 +995,7 @@
           <a:p>
             <a:fld id="{750F0EE5-0DCA-4955-91ED-88EFE3E19334}" type="datetimeFigureOut">
               <a:rPr lang="de-DE" smtClean="0"/>
-              <a:t>07.10.2025</a:t>
+              <a:t>08.10.2025</a:t>
             </a:fld>
             <a:endParaRPr lang="de-DE"/>
           </a:p>
@@ -1301,7 +1303,7 @@
           <a:p>
             <a:fld id="{750F0EE5-0DCA-4955-91ED-88EFE3E19334}" type="datetimeFigureOut">
               <a:rPr lang="de-DE" smtClean="0"/>
-              <a:t>07.10.2025</a:t>
+              <a:t>08.10.2025</a:t>
             </a:fld>
             <a:endParaRPr lang="de-DE"/>
           </a:p>
@@ -1619,7 +1621,7 @@
           <a:p>
             <a:fld id="{750F0EE5-0DCA-4955-91ED-88EFE3E19334}" type="datetimeFigureOut">
               <a:rPr lang="de-DE" smtClean="0"/>
-              <a:t>07.10.2025</a:t>
+              <a:t>08.10.2025</a:t>
             </a:fld>
             <a:endParaRPr lang="de-DE"/>
           </a:p>
@@ -1921,7 +1923,7 @@
           <a:p>
             <a:fld id="{750F0EE5-0DCA-4955-91ED-88EFE3E19334}" type="datetimeFigureOut">
               <a:rPr lang="de-DE" smtClean="0"/>
-              <a:t>07.10.2025</a:t>
+              <a:t>08.10.2025</a:t>
             </a:fld>
             <a:endParaRPr lang="de-DE"/>
           </a:p>
@@ -2288,7 +2290,7 @@
           <a:p>
             <a:fld id="{750F0EE5-0DCA-4955-91ED-88EFE3E19334}" type="datetimeFigureOut">
               <a:rPr lang="de-DE" smtClean="0"/>
-              <a:t>07.10.2025</a:t>
+              <a:t>08.10.2025</a:t>
             </a:fld>
             <a:endParaRPr lang="de-DE"/>
           </a:p>
@@ -2462,7 +2464,7 @@
           <a:p>
             <a:fld id="{750F0EE5-0DCA-4955-91ED-88EFE3E19334}" type="datetimeFigureOut">
               <a:rPr lang="de-DE" smtClean="0"/>
-              <a:t>07.10.2025</a:t>
+              <a:t>08.10.2025</a:t>
             </a:fld>
             <a:endParaRPr lang="de-DE"/>
           </a:p>
@@ -2642,7 +2644,7 @@
           <a:p>
             <a:fld id="{750F0EE5-0DCA-4955-91ED-88EFE3E19334}" type="datetimeFigureOut">
               <a:rPr lang="de-DE" smtClean="0"/>
-              <a:t>07.10.2025</a:t>
+              <a:t>08.10.2025</a:t>
             </a:fld>
             <a:endParaRPr lang="de-DE"/>
           </a:p>
@@ -2812,7 +2814,7 @@
           <a:p>
             <a:fld id="{750F0EE5-0DCA-4955-91ED-88EFE3E19334}" type="datetimeFigureOut">
               <a:rPr lang="de-DE" smtClean="0"/>
-              <a:t>07.10.2025</a:t>
+              <a:t>08.10.2025</a:t>
             </a:fld>
             <a:endParaRPr lang="de-DE"/>
           </a:p>
@@ -3062,7 +3064,7 @@
           <a:p>
             <a:fld id="{750F0EE5-0DCA-4955-91ED-88EFE3E19334}" type="datetimeFigureOut">
               <a:rPr lang="de-DE" smtClean="0"/>
-              <a:t>07.10.2025</a:t>
+              <a:t>08.10.2025</a:t>
             </a:fld>
             <a:endParaRPr lang="de-DE"/>
           </a:p>
@@ -3298,7 +3300,7 @@
           <a:p>
             <a:fld id="{750F0EE5-0DCA-4955-91ED-88EFE3E19334}" type="datetimeFigureOut">
               <a:rPr lang="de-DE" smtClean="0"/>
-              <a:t>07.10.2025</a:t>
+              <a:t>08.10.2025</a:t>
             </a:fld>
             <a:endParaRPr lang="de-DE"/>
           </a:p>
@@ -3680,7 +3682,7 @@
           <a:p>
             <a:fld id="{750F0EE5-0DCA-4955-91ED-88EFE3E19334}" type="datetimeFigureOut">
               <a:rPr lang="de-DE" smtClean="0"/>
-              <a:t>07.10.2025</a:t>
+              <a:t>08.10.2025</a:t>
             </a:fld>
             <a:endParaRPr lang="de-DE"/>
           </a:p>
@@ -3798,7 +3800,7 @@
           <a:p>
             <a:fld id="{750F0EE5-0DCA-4955-91ED-88EFE3E19334}" type="datetimeFigureOut">
               <a:rPr lang="de-DE" smtClean="0"/>
-              <a:t>07.10.2025</a:t>
+              <a:t>08.10.2025</a:t>
             </a:fld>
             <a:endParaRPr lang="de-DE"/>
           </a:p>
@@ -3893,7 +3895,7 @@
           <a:p>
             <a:fld id="{750F0EE5-0DCA-4955-91ED-88EFE3E19334}" type="datetimeFigureOut">
               <a:rPr lang="de-DE" smtClean="0"/>
-              <a:t>07.10.2025</a:t>
+              <a:t>08.10.2025</a:t>
             </a:fld>
             <a:endParaRPr lang="de-DE"/>
           </a:p>
@@ -4148,7 +4150,7 @@
           <a:p>
             <a:fld id="{750F0EE5-0DCA-4955-91ED-88EFE3E19334}" type="datetimeFigureOut">
               <a:rPr lang="de-DE" smtClean="0"/>
-              <a:t>07.10.2025</a:t>
+              <a:t>08.10.2025</a:t>
             </a:fld>
             <a:endParaRPr lang="de-DE"/>
           </a:p>
@@ -4431,7 +4433,7 @@
           <a:p>
             <a:fld id="{750F0EE5-0DCA-4955-91ED-88EFE3E19334}" type="datetimeFigureOut">
               <a:rPr lang="de-DE" smtClean="0"/>
-              <a:t>07.10.2025</a:t>
+              <a:t>08.10.2025</a:t>
             </a:fld>
             <a:endParaRPr lang="de-DE"/>
           </a:p>
@@ -4858,7 +4860,7 @@
           <a:p>
             <a:fld id="{750F0EE5-0DCA-4955-91ED-88EFE3E19334}" type="datetimeFigureOut">
               <a:rPr lang="de-DE" smtClean="0"/>
-              <a:t>07.10.2025</a:t>
+              <a:t>08.10.2025</a:t>
             </a:fld>
             <a:endParaRPr lang="de-DE"/>
           </a:p>
@@ -6099,7 +6101,7 @@
               <a:buChar char=""/>
             </a:pPr>
             <a:r>
-              <a:rPr lang="en-US"/>
+              <a:rPr lang="en-US" dirty="0"/>
               <a:t>Sabine Pfeifer</a:t>
             </a:r>
           </a:p>
@@ -6119,7 +6121,7 @@
               <a:buChar char=""/>
             </a:pPr>
             <a:r>
-              <a:rPr lang="en-US"/>
+              <a:rPr lang="en-US" dirty="0"/>
               <a:t>Maximilian Mayer</a:t>
             </a:r>
           </a:p>
@@ -6139,8 +6141,8 @@
               <a:buChar char=""/>
             </a:pPr>
             <a:r>
-              <a:rPr lang="en-US"/>
-              <a:t>TI / TIB</a:t>
+              <a:rPr lang="en-US" dirty="0"/>
+              <a:t>Daniel Hartl</a:t>
             </a:r>
           </a:p>
           <a:p>
@@ -6159,8 +6161,8 @@
               <a:buChar char=""/>
             </a:pPr>
             <a:r>
-              <a:rPr lang="en-US"/>
-              <a:t>23456 WPM Advanced Programming​</a:t>
+              <a:rPr lang="en-US" dirty="0"/>
+              <a:t>TI / TIB</a:t>
             </a:r>
           </a:p>
           <a:p>
@@ -6179,7 +6181,27 @@
               <a:buChar char=""/>
             </a:pPr>
             <a:r>
-              <a:rPr lang="en-US"/>
+              <a:rPr lang="en-US" dirty="0"/>
+              <a:t>23456 WPM Advanced Programming​</a:t>
+            </a:r>
+          </a:p>
+          <a:p>
+            <a:pPr fontAlgn="base">
+              <a:spcBef>
+                <a:spcPct val="20000"/>
+              </a:spcBef>
+              <a:spcAft>
+                <a:spcPts val="600"/>
+              </a:spcAft>
+              <a:buClr>
+                <a:schemeClr val="tx1"/>
+              </a:buClr>
+              <a:buSzPct val="80000"/>
+              <a:buFont typeface="Wingdings 3" panose="05040102010807070707" pitchFamily="18" charset="2"/>
+              <a:buChar char=""/>
+            </a:pPr>
+            <a:r>
+              <a:rPr lang="en-US" dirty="0"/>
               <a:t>Prof. Dr. Rembold</a:t>
             </a:r>
           </a:p>
@@ -6215,7 +6237,7 @@
           <a:p>
             <a:r>
               <a:rPr lang="de-DE" sz="4400" dirty="0"/>
-              <a:t>Bus-Reservierungs-System für Vereinsfahrten</a:t>
+              <a:t>Bus-Reservierungs-System für Vereinsfahrten (Fasnet)</a:t>
             </a:r>
           </a:p>
         </p:txBody>
@@ -6397,7 +6419,7 @@
         <p:spPr>
           <a:xfrm>
             <a:off x="828675" y="4135011"/>
-            <a:ext cx="10496550" cy="954107"/>
+            <a:ext cx="10496550" cy="1169551"/>
           </a:xfrm>
           <a:prstGeom prst="rect">
             <a:avLst/>
@@ -6426,7 +6448,7 @@
             </a:pPr>
             <a:r>
               <a:rPr lang="de-DE" sz="1400" dirty="0"/>
-              <a:t>Anzeigen der geplanten Vereinsfahrten</a:t>
+              <a:t>Anmeldung als Admin, Admin kann die Ausflüge einstellen, sowie eine automatische Anfrage (Mail) an diverse Bus-Unternehmen versenden </a:t>
             </a:r>
           </a:p>
           <a:p>
@@ -6524,7 +6546,7 @@
         </p:nvSpPr>
         <p:spPr>
           <a:xfrm>
-            <a:off x="1333499" y="4544793"/>
+            <a:off x="742949" y="4544793"/>
             <a:ext cx="1352550" cy="647699"/>
           </a:xfrm>
           <a:prstGeom prst="rect">
@@ -6583,8 +6605,8 @@
         </p:nvSpPr>
         <p:spPr>
           <a:xfrm>
-            <a:off x="3248024" y="3227624"/>
-            <a:ext cx="6938195" cy="2209615"/>
+            <a:off x="2657474" y="3227625"/>
+            <a:ext cx="8435976" cy="2169876"/>
           </a:xfrm>
           <a:prstGeom prst="rect">
             <a:avLst/>
@@ -6634,8 +6656,8 @@
         </p:nvSpPr>
         <p:spPr>
           <a:xfrm>
-            <a:off x="8629650" y="4544793"/>
-            <a:ext cx="1352550" cy="647699"/>
+            <a:off x="7981949" y="4373341"/>
+            <a:ext cx="2844800" cy="819151"/>
           </a:xfrm>
           <a:prstGeom prst="rect">
             <a:avLst/>
@@ -6667,7 +6689,30 @@
             <a:pPr algn="ctr"/>
             <a:r>
               <a:rPr lang="de-DE" sz="1600" dirty="0"/>
-              <a:t>Datenbank (SQLITE)</a:t>
+              <a:t>Datenbank </a:t>
+            </a:r>
+            <a:br>
+              <a:rPr lang="de-DE" sz="1600" dirty="0"/>
+            </a:br>
+            <a:r>
+              <a:rPr lang="de-DE" sz="1600" dirty="0"/>
+              <a:t>(</a:t>
+            </a:r>
+            <a:r>
+              <a:rPr lang="de-DE" sz="1600" dirty="0" err="1"/>
+              <a:t>mySQL</a:t>
+            </a:r>
+            <a:r>
+              <a:rPr lang="de-DE" sz="1600" dirty="0"/>
+              <a:t>, mongo, </a:t>
+            </a:r>
+            <a:r>
+              <a:rPr lang="de-DE" sz="1600" dirty="0" err="1"/>
+              <a:t>Postgre</a:t>
+            </a:r>
+            <a:r>
+              <a:rPr lang="de-DE" sz="1600" dirty="0"/>
+              <a:t>)</a:t>
             </a:r>
           </a:p>
         </p:txBody>
@@ -6686,7 +6731,7 @@
         </p:nvSpPr>
         <p:spPr>
           <a:xfrm>
-            <a:off x="5867399" y="4373341"/>
+            <a:off x="5276849" y="4373341"/>
             <a:ext cx="1943100" cy="800099"/>
           </a:xfrm>
           <a:prstGeom prst="rect">
@@ -6745,7 +6790,7 @@
         </p:nvSpPr>
         <p:spPr>
           <a:xfrm>
-            <a:off x="3535573" y="4373342"/>
+            <a:off x="2945023" y="4373342"/>
             <a:ext cx="1681794" cy="761996"/>
           </a:xfrm>
           <a:prstGeom prst="rect">
@@ -6800,53 +6845,8 @@
         </p:nvCxnSpPr>
         <p:spPr>
           <a:xfrm>
-            <a:off x="2686049" y="4868643"/>
+            <a:off x="2095499" y="4868643"/>
             <a:ext cx="914400" cy="0"/>
-          </a:xfrm>
-          <a:prstGeom prst="straightConnector1">
-            <a:avLst/>
-          </a:prstGeom>
-          <a:ln w="53975">
-            <a:solidFill>
-              <a:schemeClr val="tx1"/>
-            </a:solidFill>
-            <a:headEnd type="triangle"/>
-            <a:tailEnd type="triangle"/>
-          </a:ln>
-        </p:spPr>
-        <p:style>
-          <a:lnRef idx="2">
-            <a:schemeClr val="accent1"/>
-          </a:lnRef>
-          <a:fillRef idx="0">
-            <a:schemeClr val="accent1"/>
-          </a:fillRef>
-          <a:effectRef idx="1">
-            <a:schemeClr val="accent1"/>
-          </a:effectRef>
-          <a:fontRef idx="minor">
-            <a:schemeClr val="tx1"/>
-          </a:fontRef>
-        </p:style>
-      </p:cxnSp>
-      <p:cxnSp>
-        <p:nvCxnSpPr>
-          <p:cNvPr id="16" name="Gerade Verbindung mit Pfeil 15">
-            <a:extLst>
-              <a:ext uri="{FF2B5EF4-FFF2-40B4-BE49-F238E27FC236}">
-                <a16:creationId xmlns:a16="http://schemas.microsoft.com/office/drawing/2014/main" id="{046947BD-57CA-6C00-3089-CEC802CCCE1E}"/>
-              </a:ext>
-            </a:extLst>
-          </p:cNvPr>
-          <p:cNvCxnSpPr>
-            <a:cxnSpLocks/>
-          </p:cNvCxnSpPr>
-          <p:nvPr/>
-        </p:nvCxnSpPr>
-        <p:spPr>
-          <a:xfrm>
-            <a:off x="4952999" y="4868639"/>
-            <a:ext cx="914400" cy="3"/>
           </a:xfrm>
           <a:prstGeom prst="straightConnector1">
             <a:avLst/>
@@ -6890,7 +6890,52 @@
         </p:nvCxnSpPr>
         <p:spPr>
           <a:xfrm flipV="1">
-            <a:off x="7810499" y="4868638"/>
+            <a:off x="7219949" y="4868638"/>
+            <a:ext cx="762000" cy="1"/>
+          </a:xfrm>
+          <a:prstGeom prst="straightConnector1">
+            <a:avLst/>
+          </a:prstGeom>
+          <a:ln w="53975">
+            <a:solidFill>
+              <a:schemeClr val="tx1"/>
+            </a:solidFill>
+            <a:headEnd type="triangle"/>
+            <a:tailEnd type="triangle"/>
+          </a:ln>
+        </p:spPr>
+        <p:style>
+          <a:lnRef idx="2">
+            <a:schemeClr val="accent1"/>
+          </a:lnRef>
+          <a:fillRef idx="0">
+            <a:schemeClr val="accent1"/>
+          </a:fillRef>
+          <a:effectRef idx="1">
+            <a:schemeClr val="accent1"/>
+          </a:effectRef>
+          <a:fontRef idx="minor">
+            <a:schemeClr val="tx1"/>
+          </a:fontRef>
+        </p:style>
+      </p:cxnSp>
+      <p:cxnSp>
+        <p:nvCxnSpPr>
+          <p:cNvPr id="5" name="Gerade Verbindung mit Pfeil 4">
+            <a:extLst>
+              <a:ext uri="{FF2B5EF4-FFF2-40B4-BE49-F238E27FC236}">
+                <a16:creationId xmlns:a16="http://schemas.microsoft.com/office/drawing/2014/main" id="{44784683-FF0D-A18C-6FAB-AA753FFC80DF}"/>
+              </a:ext>
+            </a:extLst>
+          </p:cNvPr>
+          <p:cNvCxnSpPr>
+            <a:cxnSpLocks/>
+          </p:cNvCxnSpPr>
+          <p:nvPr/>
+        </p:nvCxnSpPr>
+        <p:spPr>
+          <a:xfrm flipV="1">
+            <a:off x="4571999" y="4868638"/>
             <a:ext cx="762000" cy="1"/>
           </a:xfrm>
           <a:prstGeom prst="straightConnector1">
@@ -6951,6 +6996,71 @@
       </p:grpSpPr>
       <p:sp>
         <p:nvSpPr>
+          <p:cNvPr id="5" name="Textfeld 4">
+            <a:extLst>
+              <a:ext uri="{FF2B5EF4-FFF2-40B4-BE49-F238E27FC236}">
+                <a16:creationId xmlns:a16="http://schemas.microsoft.com/office/drawing/2014/main" id="{48AA60A2-8E17-8E86-EA11-4CA5160864CA}"/>
+              </a:ext>
+            </a:extLst>
+          </p:cNvPr>
+          <p:cNvSpPr txBox="1"/>
+          <p:nvPr/>
+        </p:nvSpPr>
+        <p:spPr>
+          <a:xfrm>
+            <a:off x="828675" y="676275"/>
+            <a:ext cx="5029200" cy="769441"/>
+          </a:xfrm>
+          <a:prstGeom prst="rect">
+            <a:avLst/>
+          </a:prstGeom>
+          <a:noFill/>
+        </p:spPr>
+        <p:txBody>
+          <a:bodyPr wrap="square" rtlCol="0">
+            <a:spAutoFit/>
+          </a:bodyPr>
+          <a:lstStyle/>
+          <a:p>
+            <a:r>
+              <a:rPr lang="de-DE" sz="4400" dirty="0"/>
+              <a:t>User-Storys</a:t>
+            </a:r>
+          </a:p>
+        </p:txBody>
+      </p:sp>
+    </p:spTree>
+    <p:extLst>
+      <p:ext uri="{BB962C8B-B14F-4D97-AF65-F5344CB8AC3E}">
+        <p14:creationId xmlns:p14="http://schemas.microsoft.com/office/powerpoint/2010/main" val="1109510871"/>
+      </p:ext>
+    </p:extLst>
+  </p:cSld>
+  <p:clrMapOvr>
+    <a:masterClrMapping/>
+  </p:clrMapOvr>
+</p:sld>
+</file>
+
+<file path=ppt/slides/slide5.xml><?xml version="1.0" encoding="utf-8"?>
+<p:sld xmlns:a="http://schemas.openxmlformats.org/drawingml/2006/main" xmlns:r="http://schemas.openxmlformats.org/officeDocument/2006/relationships" xmlns:p="http://schemas.openxmlformats.org/presentationml/2006/main">
+  <p:cSld>
+    <p:spTree>
+      <p:nvGrpSpPr>
+        <p:cNvPr id="1" name=""/>
+        <p:cNvGrpSpPr/>
+        <p:nvPr/>
+      </p:nvGrpSpPr>
+      <p:grpSpPr>
+        <a:xfrm>
+          <a:off x="0" y="0"/>
+          <a:ext cx="0" cy="0"/>
+          <a:chOff x="0" y="0"/>
+          <a:chExt cx="0" cy="0"/>
+        </a:xfrm>
+      </p:grpSpPr>
+      <p:sp>
+        <p:nvSpPr>
           <p:cNvPr id="4" name="Textfeld 3">
             <a:extLst>
               <a:ext uri="{FF2B5EF4-FFF2-40B4-BE49-F238E27FC236}">
@@ -7171,7 +7281,7 @@
 </p:sld>
 </file>
 
-<file path=ppt/slides/slide5.xml><?xml version="1.0" encoding="utf-8"?>
+<file path=ppt/slides/slide6.xml><?xml version="1.0" encoding="utf-8"?>
 <p:sld xmlns:a="http://schemas.openxmlformats.org/drawingml/2006/main" xmlns:r="http://schemas.openxmlformats.org/officeDocument/2006/relationships" xmlns:p="http://schemas.openxmlformats.org/presentationml/2006/main">
   <p:cSld>
     <p:spTree>
@@ -7808,10 +7918,766 @@
           </a:p>
         </p:txBody>
       </p:sp>
+      <p:sp>
+        <p:nvSpPr>
+          <p:cNvPr id="2" name="Textfeld 1">
+            <a:extLst>
+              <a:ext uri="{FF2B5EF4-FFF2-40B4-BE49-F238E27FC236}">
+                <a16:creationId xmlns:a16="http://schemas.microsoft.com/office/drawing/2014/main" id="{22AD0B8C-E77E-90AB-E0E0-435943D2D029}"/>
+              </a:ext>
+            </a:extLst>
+          </p:cNvPr>
+          <p:cNvSpPr txBox="1"/>
+          <p:nvPr/>
+        </p:nvSpPr>
+        <p:spPr>
+          <a:xfrm>
+            <a:off x="828675" y="1507272"/>
+            <a:ext cx="10496550" cy="307777"/>
+          </a:xfrm>
+          <a:prstGeom prst="rect">
+            <a:avLst/>
+          </a:prstGeom>
+          <a:noFill/>
+        </p:spPr>
+        <p:txBody>
+          <a:bodyPr wrap="square" rtlCol="0">
+            <a:spAutoFit/>
+          </a:bodyPr>
+          <a:lstStyle/>
+          <a:p>
+            <a:r>
+              <a:rPr lang="de-DE" sz="1400" dirty="0"/>
+              <a:t>Anmeldung als User</a:t>
+            </a:r>
+          </a:p>
+        </p:txBody>
+      </p:sp>
     </p:spTree>
     <p:extLst>
       <p:ext uri="{BB962C8B-B14F-4D97-AF65-F5344CB8AC3E}">
         <p14:creationId xmlns:p14="http://schemas.microsoft.com/office/powerpoint/2010/main" val="2903602163"/>
+      </p:ext>
+    </p:extLst>
+  </p:cSld>
+  <p:clrMapOvr>
+    <a:masterClrMapping/>
+  </p:clrMapOvr>
+</p:sld>
+</file>
+
+<file path=ppt/slides/slide7.xml><?xml version="1.0" encoding="utf-8"?>
+<p:sld xmlns:a="http://schemas.openxmlformats.org/drawingml/2006/main" xmlns:r="http://schemas.openxmlformats.org/officeDocument/2006/relationships" xmlns:p="http://schemas.openxmlformats.org/presentationml/2006/main">
+  <p:cSld>
+    <p:spTree>
+      <p:nvGrpSpPr>
+        <p:cNvPr id="1" name=""/>
+        <p:cNvGrpSpPr/>
+        <p:nvPr/>
+      </p:nvGrpSpPr>
+      <p:grpSpPr>
+        <a:xfrm>
+          <a:off x="0" y="0"/>
+          <a:ext cx="0" cy="0"/>
+          <a:chOff x="0" y="0"/>
+          <a:chExt cx="0" cy="0"/>
+        </a:xfrm>
+      </p:grpSpPr>
+      <p:sp>
+        <p:nvSpPr>
+          <p:cNvPr id="4" name="Textfeld 3">
+            <a:extLst>
+              <a:ext uri="{FF2B5EF4-FFF2-40B4-BE49-F238E27FC236}">
+                <a16:creationId xmlns:a16="http://schemas.microsoft.com/office/drawing/2014/main" id="{8D3CD29F-F8C7-0E54-6046-6AA7B5C778E0}"/>
+              </a:ext>
+            </a:extLst>
+          </p:cNvPr>
+          <p:cNvSpPr txBox="1"/>
+          <p:nvPr/>
+        </p:nvSpPr>
+        <p:spPr>
+          <a:xfrm>
+            <a:off x="828675" y="676275"/>
+            <a:ext cx="5029200" cy="769441"/>
+          </a:xfrm>
+          <a:prstGeom prst="rect">
+            <a:avLst/>
+          </a:prstGeom>
+          <a:noFill/>
+        </p:spPr>
+        <p:txBody>
+          <a:bodyPr wrap="square" rtlCol="0">
+            <a:spAutoFit/>
+          </a:bodyPr>
+          <a:lstStyle/>
+          <a:p>
+            <a:r>
+              <a:rPr lang="de-DE" sz="4400" dirty="0"/>
+              <a:t>Mock-UP</a:t>
+            </a:r>
+          </a:p>
+        </p:txBody>
+      </p:sp>
+      <p:sp>
+        <p:nvSpPr>
+          <p:cNvPr id="5" name="Rechteck 4">
+            <a:extLst>
+              <a:ext uri="{FF2B5EF4-FFF2-40B4-BE49-F238E27FC236}">
+                <a16:creationId xmlns:a16="http://schemas.microsoft.com/office/drawing/2014/main" id="{B252F9C1-1602-91B9-EE34-B31D42BA73AB}"/>
+              </a:ext>
+            </a:extLst>
+          </p:cNvPr>
+          <p:cNvSpPr/>
+          <p:nvPr/>
+        </p:nvSpPr>
+        <p:spPr>
+          <a:xfrm>
+            <a:off x="954287" y="1962150"/>
+            <a:ext cx="2750939" cy="3114675"/>
+          </a:xfrm>
+          <a:prstGeom prst="rect">
+            <a:avLst/>
+          </a:prstGeom>
+          <a:noFill/>
+          <a:ln w="31750">
+            <a:solidFill>
+              <a:schemeClr val="bg2">
+                <a:lumMod val="60000"/>
+                <a:lumOff val="40000"/>
+              </a:schemeClr>
+            </a:solidFill>
+          </a:ln>
+        </p:spPr>
+        <p:style>
+          <a:lnRef idx="2">
+            <a:schemeClr val="accent1">
+              <a:shade val="15000"/>
+            </a:schemeClr>
+          </a:lnRef>
+          <a:fillRef idx="1">
+            <a:schemeClr val="accent1"/>
+          </a:fillRef>
+          <a:effectRef idx="0">
+            <a:schemeClr val="accent1"/>
+          </a:effectRef>
+          <a:fontRef idx="minor">
+            <a:schemeClr val="lt1"/>
+          </a:fontRef>
+        </p:style>
+        <p:txBody>
+          <a:bodyPr rtlCol="0" anchor="t" anchorCtr="0"/>
+          <a:lstStyle/>
+          <a:p>
+            <a:r>
+              <a:rPr lang="de-DE" sz="1400" dirty="0">
+                <a:solidFill>
+                  <a:schemeClr val="tx1"/>
+                </a:solidFill>
+              </a:rPr>
+              <a:t>Login-Ansicht</a:t>
+            </a:r>
+          </a:p>
+        </p:txBody>
+      </p:sp>
+      <p:sp>
+        <p:nvSpPr>
+          <p:cNvPr id="6" name="Rechteck 5">
+            <a:extLst>
+              <a:ext uri="{FF2B5EF4-FFF2-40B4-BE49-F238E27FC236}">
+                <a16:creationId xmlns:a16="http://schemas.microsoft.com/office/drawing/2014/main" id="{BA9F6169-FDAF-4A65-361E-C8F330B07EB3}"/>
+              </a:ext>
+            </a:extLst>
+          </p:cNvPr>
+          <p:cNvSpPr/>
+          <p:nvPr/>
+        </p:nvSpPr>
+        <p:spPr>
+          <a:xfrm>
+            <a:off x="1931938" y="2885647"/>
+            <a:ext cx="795636" cy="1267680"/>
+          </a:xfrm>
+          <a:prstGeom prst="rect">
+            <a:avLst/>
+          </a:prstGeom>
+          <a:noFill/>
+          <a:ln w="31750">
+            <a:solidFill>
+              <a:schemeClr val="bg2">
+                <a:lumMod val="60000"/>
+                <a:lumOff val="40000"/>
+              </a:schemeClr>
+            </a:solidFill>
+          </a:ln>
+        </p:spPr>
+        <p:style>
+          <a:lnRef idx="2">
+            <a:schemeClr val="accent1">
+              <a:shade val="15000"/>
+            </a:schemeClr>
+          </a:lnRef>
+          <a:fillRef idx="1">
+            <a:schemeClr val="accent1"/>
+          </a:fillRef>
+          <a:effectRef idx="0">
+            <a:schemeClr val="accent1"/>
+          </a:effectRef>
+          <a:fontRef idx="minor">
+            <a:schemeClr val="lt1"/>
+          </a:fontRef>
+        </p:style>
+        <p:txBody>
+          <a:bodyPr rtlCol="0" anchor="ctr"/>
+          <a:lstStyle/>
+          <a:p>
+            <a:pPr algn="ctr"/>
+            <a:r>
+              <a:rPr lang="de-DE" sz="1400" dirty="0">
+                <a:solidFill>
+                  <a:schemeClr val="tx1"/>
+                </a:solidFill>
+              </a:rPr>
+              <a:t>Login Dialog</a:t>
+            </a:r>
+          </a:p>
+        </p:txBody>
+      </p:sp>
+      <p:sp>
+        <p:nvSpPr>
+          <p:cNvPr id="7" name="Rechteck 6">
+            <a:extLst>
+              <a:ext uri="{FF2B5EF4-FFF2-40B4-BE49-F238E27FC236}">
+                <a16:creationId xmlns:a16="http://schemas.microsoft.com/office/drawing/2014/main" id="{B6FA5970-4AA1-BB29-0264-D489D1495CF7}"/>
+              </a:ext>
+            </a:extLst>
+          </p:cNvPr>
+          <p:cNvSpPr/>
+          <p:nvPr/>
+        </p:nvSpPr>
+        <p:spPr>
+          <a:xfrm>
+            <a:off x="4249935" y="1962150"/>
+            <a:ext cx="2750939" cy="3114675"/>
+          </a:xfrm>
+          <a:prstGeom prst="rect">
+            <a:avLst/>
+          </a:prstGeom>
+          <a:noFill/>
+          <a:ln w="31750">
+            <a:solidFill>
+              <a:schemeClr val="bg2">
+                <a:lumMod val="60000"/>
+                <a:lumOff val="40000"/>
+              </a:schemeClr>
+            </a:solidFill>
+          </a:ln>
+        </p:spPr>
+        <p:style>
+          <a:lnRef idx="2">
+            <a:schemeClr val="accent1">
+              <a:shade val="15000"/>
+            </a:schemeClr>
+          </a:lnRef>
+          <a:fillRef idx="1">
+            <a:schemeClr val="accent1"/>
+          </a:fillRef>
+          <a:effectRef idx="0">
+            <a:schemeClr val="accent1"/>
+          </a:effectRef>
+          <a:fontRef idx="minor">
+            <a:schemeClr val="lt1"/>
+          </a:fontRef>
+        </p:style>
+        <p:txBody>
+          <a:bodyPr rtlCol="0" anchor="t" anchorCtr="0"/>
+          <a:lstStyle/>
+          <a:p>
+            <a:r>
+              <a:rPr lang="de-DE" sz="1400" dirty="0">
+                <a:solidFill>
+                  <a:schemeClr val="tx1"/>
+                </a:solidFill>
+              </a:rPr>
+              <a:t>Eingeloggt Übersicht</a:t>
+            </a:r>
+          </a:p>
+        </p:txBody>
+      </p:sp>
+      <p:sp>
+        <p:nvSpPr>
+          <p:cNvPr id="8" name="Rechteck 7">
+            <a:extLst>
+              <a:ext uri="{FF2B5EF4-FFF2-40B4-BE49-F238E27FC236}">
+                <a16:creationId xmlns:a16="http://schemas.microsoft.com/office/drawing/2014/main" id="{E7F54662-D698-9404-72C2-1FB2C63D3FE2}"/>
+              </a:ext>
+            </a:extLst>
+          </p:cNvPr>
+          <p:cNvSpPr/>
+          <p:nvPr/>
+        </p:nvSpPr>
+        <p:spPr>
+          <a:xfrm>
+            <a:off x="4593058" y="2571750"/>
+            <a:ext cx="2064692" cy="2257425"/>
+          </a:xfrm>
+          <a:prstGeom prst="rect">
+            <a:avLst/>
+          </a:prstGeom>
+          <a:noFill/>
+          <a:ln w="31750">
+            <a:solidFill>
+              <a:schemeClr val="bg2">
+                <a:lumMod val="60000"/>
+                <a:lumOff val="40000"/>
+              </a:schemeClr>
+            </a:solidFill>
+          </a:ln>
+        </p:spPr>
+        <p:style>
+          <a:lnRef idx="2">
+            <a:schemeClr val="accent1">
+              <a:shade val="15000"/>
+            </a:schemeClr>
+          </a:lnRef>
+          <a:fillRef idx="1">
+            <a:schemeClr val="accent1"/>
+          </a:fillRef>
+          <a:effectRef idx="0">
+            <a:schemeClr val="accent1"/>
+          </a:effectRef>
+          <a:fontRef idx="minor">
+            <a:schemeClr val="lt1"/>
+          </a:fontRef>
+        </p:style>
+        <p:txBody>
+          <a:bodyPr rtlCol="0" anchor="t" anchorCtr="0"/>
+          <a:lstStyle/>
+          <a:p>
+            <a:pPr algn="ctr"/>
+            <a:r>
+              <a:rPr lang="de-DE" sz="1400" dirty="0">
+                <a:solidFill>
+                  <a:schemeClr val="tx1"/>
+                </a:solidFill>
+              </a:rPr>
+              <a:t>Übersicht der Ausflüge</a:t>
+            </a:r>
+          </a:p>
+          <a:p>
+            <a:pPr algn="ctr"/>
+            <a:endParaRPr lang="de-DE" sz="1200" dirty="0">
+              <a:solidFill>
+                <a:schemeClr val="tx1"/>
+              </a:solidFill>
+            </a:endParaRPr>
+          </a:p>
+          <a:p>
+            <a:pPr algn="ctr"/>
+            <a:endParaRPr lang="de-DE" sz="1200" dirty="0">
+              <a:solidFill>
+                <a:schemeClr val="tx1"/>
+              </a:solidFill>
+            </a:endParaRPr>
+          </a:p>
+          <a:p>
+            <a:r>
+              <a:rPr lang="de-DE" sz="1200" dirty="0">
+                <a:solidFill>
+                  <a:schemeClr val="tx1"/>
+                </a:solidFill>
+              </a:rPr>
+              <a:t>- </a:t>
+            </a:r>
+            <a:r>
+              <a:rPr lang="de-DE" sz="1000" dirty="0">
+                <a:solidFill>
+                  <a:schemeClr val="tx1"/>
+                </a:solidFill>
+              </a:rPr>
+              <a:t>Ausflug 1</a:t>
+            </a:r>
+          </a:p>
+          <a:p>
+            <a:br>
+              <a:rPr lang="de-DE" sz="1000" dirty="0">
+                <a:solidFill>
+                  <a:schemeClr val="tx1"/>
+                </a:solidFill>
+              </a:rPr>
+            </a:br>
+            <a:r>
+              <a:rPr lang="de-DE" sz="1000" dirty="0">
+                <a:solidFill>
+                  <a:schemeClr val="tx1"/>
+                </a:solidFill>
+              </a:rPr>
+              <a:t>- Ausflug 2</a:t>
+            </a:r>
+            <a:br>
+              <a:rPr lang="de-DE" sz="1000" dirty="0">
+                <a:solidFill>
+                  <a:schemeClr val="tx1"/>
+                </a:solidFill>
+              </a:rPr>
+            </a:br>
+            <a:br>
+              <a:rPr lang="de-DE" sz="1000" dirty="0">
+                <a:solidFill>
+                  <a:schemeClr val="tx1"/>
+                </a:solidFill>
+              </a:rPr>
+            </a:br>
+            <a:r>
+              <a:rPr lang="de-DE" sz="1000" dirty="0">
+                <a:solidFill>
+                  <a:schemeClr val="tx1"/>
+                </a:solidFill>
+              </a:rPr>
+              <a:t>- Ausflug 3</a:t>
+            </a:r>
+            <a:br>
+              <a:rPr lang="de-DE" sz="1000" dirty="0">
+                <a:solidFill>
+                  <a:schemeClr val="tx1"/>
+                </a:solidFill>
+              </a:rPr>
+            </a:br>
+            <a:br>
+              <a:rPr lang="de-DE" sz="1000" dirty="0">
+                <a:solidFill>
+                  <a:schemeClr val="tx1"/>
+                </a:solidFill>
+                <a:sym typeface="Wingdings" panose="05000000000000000000" pitchFamily="2" charset="2"/>
+              </a:rPr>
+            </a:br>
+            <a:r>
+              <a:rPr lang="de-DE" sz="1000" dirty="0">
+                <a:solidFill>
+                  <a:schemeClr val="tx1"/>
+                </a:solidFill>
+                <a:sym typeface="Wingdings" panose="05000000000000000000" pitchFamily="2" charset="2"/>
+              </a:rPr>
+              <a:t>- </a:t>
+            </a:r>
+            <a:r>
+              <a:rPr lang="de-DE" sz="1000" dirty="0">
+                <a:solidFill>
+                  <a:schemeClr val="tx1"/>
+                </a:solidFill>
+              </a:rPr>
+              <a:t>Ausflug n</a:t>
+            </a:r>
+          </a:p>
+          <a:p>
+            <a:br>
+              <a:rPr lang="de-DE" sz="1000" dirty="0">
+                <a:solidFill>
+                  <a:schemeClr val="tx1"/>
+                </a:solidFill>
+              </a:rPr>
+            </a:br>
+            <a:r>
+              <a:rPr lang="de-DE" sz="1000" dirty="0">
+                <a:solidFill>
+                  <a:schemeClr val="tx1"/>
+                </a:solidFill>
+              </a:rPr>
+              <a:t>Button Ausflug hinzufügen</a:t>
+            </a:r>
+            <a:endParaRPr lang="de-DE" dirty="0">
+              <a:solidFill>
+                <a:schemeClr val="tx1"/>
+              </a:solidFill>
+            </a:endParaRPr>
+          </a:p>
+          <a:p>
+            <a:pPr algn="ctr"/>
+            <a:br>
+              <a:rPr lang="de-DE" dirty="0">
+                <a:solidFill>
+                  <a:schemeClr val="tx1"/>
+                </a:solidFill>
+              </a:rPr>
+            </a:br>
+            <a:endParaRPr lang="de-DE" dirty="0">
+              <a:solidFill>
+                <a:schemeClr val="tx1"/>
+              </a:solidFill>
+            </a:endParaRPr>
+          </a:p>
+          <a:p>
+            <a:pPr algn="ctr"/>
+            <a:endParaRPr lang="de-DE" dirty="0">
+              <a:solidFill>
+                <a:schemeClr val="tx1"/>
+              </a:solidFill>
+            </a:endParaRPr>
+          </a:p>
+        </p:txBody>
+      </p:sp>
+      <p:sp>
+        <p:nvSpPr>
+          <p:cNvPr id="9" name="Rechteck 8">
+            <a:extLst>
+              <a:ext uri="{FF2B5EF4-FFF2-40B4-BE49-F238E27FC236}">
+                <a16:creationId xmlns:a16="http://schemas.microsoft.com/office/drawing/2014/main" id="{1F2032C8-C8B1-4F43-0626-0C96C5DE465F}"/>
+              </a:ext>
+            </a:extLst>
+          </p:cNvPr>
+          <p:cNvSpPr/>
+          <p:nvPr/>
+        </p:nvSpPr>
+        <p:spPr>
+          <a:xfrm>
+            <a:off x="7545583" y="1962150"/>
+            <a:ext cx="2750939" cy="3114675"/>
+          </a:xfrm>
+          <a:prstGeom prst="rect">
+            <a:avLst/>
+          </a:prstGeom>
+          <a:noFill/>
+          <a:ln w="31750">
+            <a:solidFill>
+              <a:schemeClr val="bg2">
+                <a:lumMod val="60000"/>
+                <a:lumOff val="40000"/>
+              </a:schemeClr>
+            </a:solidFill>
+          </a:ln>
+        </p:spPr>
+        <p:style>
+          <a:lnRef idx="2">
+            <a:schemeClr val="accent1">
+              <a:shade val="15000"/>
+            </a:schemeClr>
+          </a:lnRef>
+          <a:fillRef idx="1">
+            <a:schemeClr val="accent1"/>
+          </a:fillRef>
+          <a:effectRef idx="0">
+            <a:schemeClr val="accent1"/>
+          </a:effectRef>
+          <a:fontRef idx="minor">
+            <a:schemeClr val="lt1"/>
+          </a:fontRef>
+        </p:style>
+        <p:txBody>
+          <a:bodyPr rtlCol="0" anchor="t" anchorCtr="0"/>
+          <a:lstStyle/>
+          <a:p>
+            <a:r>
+              <a:rPr lang="de-DE" sz="1400" dirty="0">
+                <a:solidFill>
+                  <a:schemeClr val="tx1"/>
+                </a:solidFill>
+              </a:rPr>
+              <a:t>Ausflug n </a:t>
+            </a:r>
+          </a:p>
+        </p:txBody>
+      </p:sp>
+      <p:sp>
+        <p:nvSpPr>
+          <p:cNvPr id="10" name="Rechteck 9">
+            <a:extLst>
+              <a:ext uri="{FF2B5EF4-FFF2-40B4-BE49-F238E27FC236}">
+                <a16:creationId xmlns:a16="http://schemas.microsoft.com/office/drawing/2014/main" id="{77E89D22-2EA6-DBBE-D47B-552C6CCE718F}"/>
+              </a:ext>
+            </a:extLst>
+          </p:cNvPr>
+          <p:cNvSpPr/>
+          <p:nvPr/>
+        </p:nvSpPr>
+        <p:spPr>
+          <a:xfrm>
+            <a:off x="7888706" y="2647950"/>
+            <a:ext cx="2064692" cy="2257425"/>
+          </a:xfrm>
+          <a:prstGeom prst="rect">
+            <a:avLst/>
+          </a:prstGeom>
+          <a:noFill/>
+          <a:ln w="31750">
+            <a:solidFill>
+              <a:schemeClr val="bg2">
+                <a:lumMod val="60000"/>
+                <a:lumOff val="40000"/>
+              </a:schemeClr>
+            </a:solidFill>
+          </a:ln>
+        </p:spPr>
+        <p:style>
+          <a:lnRef idx="2">
+            <a:schemeClr val="accent1">
+              <a:shade val="15000"/>
+            </a:schemeClr>
+          </a:lnRef>
+          <a:fillRef idx="1">
+            <a:schemeClr val="accent1"/>
+          </a:fillRef>
+          <a:effectRef idx="0">
+            <a:schemeClr val="accent1"/>
+          </a:effectRef>
+          <a:fontRef idx="minor">
+            <a:schemeClr val="lt1"/>
+          </a:fontRef>
+        </p:style>
+        <p:txBody>
+          <a:bodyPr rtlCol="0" anchor="t" anchorCtr="0"/>
+          <a:lstStyle/>
+          <a:p>
+            <a:pPr algn="ctr"/>
+            <a:r>
+              <a:rPr lang="de-DE" sz="1400" dirty="0">
+                <a:solidFill>
+                  <a:schemeClr val="tx1"/>
+                </a:solidFill>
+              </a:rPr>
+              <a:t>Information zum Ausflug</a:t>
+            </a:r>
+          </a:p>
+          <a:p>
+            <a:endParaRPr lang="de-DE" sz="1000" dirty="0">
+              <a:solidFill>
+                <a:schemeClr val="tx1"/>
+              </a:solidFill>
+            </a:endParaRPr>
+          </a:p>
+          <a:p>
+            <a:r>
+              <a:rPr lang="de-DE" sz="1000" dirty="0">
+                <a:solidFill>
+                  <a:schemeClr val="tx1"/>
+                </a:solidFill>
+              </a:rPr>
+              <a:t>Datum, Ziel, Uhrzeit, …</a:t>
+            </a:r>
+            <a:br>
+              <a:rPr lang="de-DE" sz="1000" dirty="0">
+                <a:solidFill>
+                  <a:schemeClr val="tx1"/>
+                </a:solidFill>
+              </a:rPr>
+            </a:br>
+            <a:br>
+              <a:rPr lang="de-DE" sz="1000" dirty="0">
+                <a:solidFill>
+                  <a:schemeClr val="tx1"/>
+                </a:solidFill>
+              </a:rPr>
+            </a:br>
+            <a:r>
+              <a:rPr lang="de-DE" sz="1000" dirty="0">
+                <a:solidFill>
+                  <a:schemeClr val="tx1"/>
+                </a:solidFill>
+              </a:rPr>
+              <a:t>Button reservieren</a:t>
+            </a:r>
+            <a:br>
+              <a:rPr lang="de-DE" sz="1000" dirty="0">
+                <a:solidFill>
+                  <a:schemeClr val="tx1"/>
+                </a:solidFill>
+              </a:rPr>
+            </a:br>
+            <a:br>
+              <a:rPr lang="de-DE" sz="1000" dirty="0">
+                <a:solidFill>
+                  <a:schemeClr val="tx1"/>
+                </a:solidFill>
+                <a:sym typeface="Wingdings" panose="05000000000000000000" pitchFamily="2" charset="2"/>
+              </a:rPr>
+            </a:br>
+            <a:r>
+              <a:rPr lang="de-DE" sz="1000" dirty="0">
+                <a:solidFill>
+                  <a:schemeClr val="tx1"/>
+                </a:solidFill>
+                <a:sym typeface="Wingdings" panose="05000000000000000000" pitchFamily="2" charset="2"/>
+              </a:rPr>
+              <a:t>Auslastung des Buses </a:t>
+            </a:r>
+          </a:p>
+          <a:p>
+            <a:endParaRPr lang="de-DE" sz="1000" dirty="0">
+              <a:solidFill>
+                <a:schemeClr val="tx1"/>
+              </a:solidFill>
+              <a:sym typeface="Wingdings" panose="05000000000000000000" pitchFamily="2" charset="2"/>
+            </a:endParaRPr>
+          </a:p>
+          <a:p>
+            <a:r>
+              <a:rPr lang="de-DE" sz="1000" dirty="0">
+                <a:solidFill>
+                  <a:schemeClr val="tx1"/>
+                </a:solidFill>
+                <a:sym typeface="Wingdings" panose="05000000000000000000" pitchFamily="2" charset="2"/>
+              </a:rPr>
+              <a:t>Button Busunternehmen Anfragen</a:t>
+            </a:r>
+            <a:br>
+              <a:rPr lang="de-DE" dirty="0">
+                <a:solidFill>
+                  <a:schemeClr val="tx1"/>
+                </a:solidFill>
+              </a:rPr>
+            </a:br>
+            <a:endParaRPr lang="de-DE" dirty="0">
+              <a:solidFill>
+                <a:schemeClr val="tx1"/>
+              </a:solidFill>
+            </a:endParaRPr>
+          </a:p>
+          <a:p>
+            <a:pPr algn="ctr"/>
+            <a:endParaRPr lang="de-DE" dirty="0">
+              <a:solidFill>
+                <a:schemeClr val="tx1"/>
+              </a:solidFill>
+            </a:endParaRPr>
+          </a:p>
+        </p:txBody>
+      </p:sp>
+      <p:sp>
+        <p:nvSpPr>
+          <p:cNvPr id="11" name="Textfeld 10">
+            <a:extLst>
+              <a:ext uri="{FF2B5EF4-FFF2-40B4-BE49-F238E27FC236}">
+                <a16:creationId xmlns:a16="http://schemas.microsoft.com/office/drawing/2014/main" id="{C03F003D-979C-D0D0-6627-64A29B4ECBB5}"/>
+              </a:ext>
+            </a:extLst>
+          </p:cNvPr>
+          <p:cNvSpPr txBox="1"/>
+          <p:nvPr/>
+        </p:nvSpPr>
+        <p:spPr>
+          <a:xfrm>
+            <a:off x="828675" y="1507272"/>
+            <a:ext cx="10496550" cy="307777"/>
+          </a:xfrm>
+          <a:prstGeom prst="rect">
+            <a:avLst/>
+          </a:prstGeom>
+          <a:noFill/>
+        </p:spPr>
+        <p:txBody>
+          <a:bodyPr wrap="square" rtlCol="0">
+            <a:spAutoFit/>
+          </a:bodyPr>
+          <a:lstStyle/>
+          <a:p>
+            <a:r>
+              <a:rPr lang="de-DE" sz="1400" dirty="0"/>
+              <a:t>Anmeldung als Admin </a:t>
+            </a:r>
+          </a:p>
+        </p:txBody>
+      </p:sp>
+    </p:spTree>
+    <p:extLst>
+      <p:ext uri="{BB962C8B-B14F-4D97-AF65-F5344CB8AC3E}">
+        <p14:creationId xmlns:p14="http://schemas.microsoft.com/office/powerpoint/2010/main" val="3147401547"/>
       </p:ext>
     </p:extLst>
   </p:cSld>

</xml_diff>

<commit_message>
PowerPoint angepasst Link zu Mock-UP
</commit_message>
<xml_diff>
--- a/Busreservierungssystem für Vereinsfahrten3_2.pptx
+++ b/Busreservierungssystem für Vereinsfahrten3_2.pptx
@@ -7,8 +7,8 @@
   <p:sldIdLst>
     <p:sldId id="256" r:id="rId2"/>
     <p:sldId id="259" r:id="rId3"/>
-    <p:sldId id="258" r:id="rId4"/>
-    <p:sldId id="261" r:id="rId5"/>
+    <p:sldId id="261" r:id="rId4"/>
+    <p:sldId id="258" r:id="rId5"/>
     <p:sldId id="260" r:id="rId6"/>
     <p:sldId id="257" r:id="rId7"/>
     <p:sldId id="262" r:id="rId8"/>
@@ -309,7 +309,7 @@
           <a:p>
             <a:fld id="{750F0EE5-0DCA-4955-91ED-88EFE3E19334}" type="datetimeFigureOut">
               <a:rPr lang="de-DE" smtClean="0"/>
-              <a:t>12.10.2025</a:t>
+              <a:t>13.10.2025</a:t>
             </a:fld>
             <a:endParaRPr lang="de-DE"/>
           </a:p>
@@ -745,7 +745,7 @@
           <a:p>
             <a:fld id="{750F0EE5-0DCA-4955-91ED-88EFE3E19334}" type="datetimeFigureOut">
               <a:rPr lang="de-DE" smtClean="0"/>
-              <a:t>12.10.2025</a:t>
+              <a:t>13.10.2025</a:t>
             </a:fld>
             <a:endParaRPr lang="de-DE"/>
           </a:p>
@@ -995,7 +995,7 @@
           <a:p>
             <a:fld id="{750F0EE5-0DCA-4955-91ED-88EFE3E19334}" type="datetimeFigureOut">
               <a:rPr lang="de-DE" smtClean="0"/>
-              <a:t>12.10.2025</a:t>
+              <a:t>13.10.2025</a:t>
             </a:fld>
             <a:endParaRPr lang="de-DE"/>
           </a:p>
@@ -1303,7 +1303,7 @@
           <a:p>
             <a:fld id="{750F0EE5-0DCA-4955-91ED-88EFE3E19334}" type="datetimeFigureOut">
               <a:rPr lang="de-DE" smtClean="0"/>
-              <a:t>12.10.2025</a:t>
+              <a:t>13.10.2025</a:t>
             </a:fld>
             <a:endParaRPr lang="de-DE"/>
           </a:p>
@@ -1621,7 +1621,7 @@
           <a:p>
             <a:fld id="{750F0EE5-0DCA-4955-91ED-88EFE3E19334}" type="datetimeFigureOut">
               <a:rPr lang="de-DE" smtClean="0"/>
-              <a:t>12.10.2025</a:t>
+              <a:t>13.10.2025</a:t>
             </a:fld>
             <a:endParaRPr lang="de-DE"/>
           </a:p>
@@ -1923,7 +1923,7 @@
           <a:p>
             <a:fld id="{750F0EE5-0DCA-4955-91ED-88EFE3E19334}" type="datetimeFigureOut">
               <a:rPr lang="de-DE" smtClean="0"/>
-              <a:t>12.10.2025</a:t>
+              <a:t>13.10.2025</a:t>
             </a:fld>
             <a:endParaRPr lang="de-DE"/>
           </a:p>
@@ -2290,7 +2290,7 @@
           <a:p>
             <a:fld id="{750F0EE5-0DCA-4955-91ED-88EFE3E19334}" type="datetimeFigureOut">
               <a:rPr lang="de-DE" smtClean="0"/>
-              <a:t>12.10.2025</a:t>
+              <a:t>13.10.2025</a:t>
             </a:fld>
             <a:endParaRPr lang="de-DE"/>
           </a:p>
@@ -2464,7 +2464,7 @@
           <a:p>
             <a:fld id="{750F0EE5-0DCA-4955-91ED-88EFE3E19334}" type="datetimeFigureOut">
               <a:rPr lang="de-DE" smtClean="0"/>
-              <a:t>12.10.2025</a:t>
+              <a:t>13.10.2025</a:t>
             </a:fld>
             <a:endParaRPr lang="de-DE"/>
           </a:p>
@@ -2644,7 +2644,7 @@
           <a:p>
             <a:fld id="{750F0EE5-0DCA-4955-91ED-88EFE3E19334}" type="datetimeFigureOut">
               <a:rPr lang="de-DE" smtClean="0"/>
-              <a:t>12.10.2025</a:t>
+              <a:t>13.10.2025</a:t>
             </a:fld>
             <a:endParaRPr lang="de-DE"/>
           </a:p>
@@ -2814,7 +2814,7 @@
           <a:p>
             <a:fld id="{750F0EE5-0DCA-4955-91ED-88EFE3E19334}" type="datetimeFigureOut">
               <a:rPr lang="de-DE" smtClean="0"/>
-              <a:t>12.10.2025</a:t>
+              <a:t>13.10.2025</a:t>
             </a:fld>
             <a:endParaRPr lang="de-DE"/>
           </a:p>
@@ -3064,7 +3064,7 @@
           <a:p>
             <a:fld id="{750F0EE5-0DCA-4955-91ED-88EFE3E19334}" type="datetimeFigureOut">
               <a:rPr lang="de-DE" smtClean="0"/>
-              <a:t>12.10.2025</a:t>
+              <a:t>13.10.2025</a:t>
             </a:fld>
             <a:endParaRPr lang="de-DE"/>
           </a:p>
@@ -3300,7 +3300,7 @@
           <a:p>
             <a:fld id="{750F0EE5-0DCA-4955-91ED-88EFE3E19334}" type="datetimeFigureOut">
               <a:rPr lang="de-DE" smtClean="0"/>
-              <a:t>12.10.2025</a:t>
+              <a:t>13.10.2025</a:t>
             </a:fld>
             <a:endParaRPr lang="de-DE"/>
           </a:p>
@@ -3682,7 +3682,7 @@
           <a:p>
             <a:fld id="{750F0EE5-0DCA-4955-91ED-88EFE3E19334}" type="datetimeFigureOut">
               <a:rPr lang="de-DE" smtClean="0"/>
-              <a:t>12.10.2025</a:t>
+              <a:t>13.10.2025</a:t>
             </a:fld>
             <a:endParaRPr lang="de-DE"/>
           </a:p>
@@ -3800,7 +3800,7 @@
           <a:p>
             <a:fld id="{750F0EE5-0DCA-4955-91ED-88EFE3E19334}" type="datetimeFigureOut">
               <a:rPr lang="de-DE" smtClean="0"/>
-              <a:t>12.10.2025</a:t>
+              <a:t>13.10.2025</a:t>
             </a:fld>
             <a:endParaRPr lang="de-DE"/>
           </a:p>
@@ -3895,7 +3895,7 @@
           <a:p>
             <a:fld id="{750F0EE5-0DCA-4955-91ED-88EFE3E19334}" type="datetimeFigureOut">
               <a:rPr lang="de-DE" smtClean="0"/>
-              <a:t>12.10.2025</a:t>
+              <a:t>13.10.2025</a:t>
             </a:fld>
             <a:endParaRPr lang="de-DE"/>
           </a:p>
@@ -4150,7 +4150,7 @@
           <a:p>
             <a:fld id="{750F0EE5-0DCA-4955-91ED-88EFE3E19334}" type="datetimeFigureOut">
               <a:rPr lang="de-DE" smtClean="0"/>
-              <a:t>12.10.2025</a:t>
+              <a:t>13.10.2025</a:t>
             </a:fld>
             <a:endParaRPr lang="de-DE"/>
           </a:p>
@@ -4433,7 +4433,7 @@
           <a:p>
             <a:fld id="{750F0EE5-0DCA-4955-91ED-88EFE3E19334}" type="datetimeFigureOut">
               <a:rPr lang="de-DE" smtClean="0"/>
-              <a:t>12.10.2025</a:t>
+              <a:t>13.10.2025</a:t>
             </a:fld>
             <a:endParaRPr lang="de-DE"/>
           </a:p>
@@ -4860,7 +4860,7 @@
           <a:p>
             <a:fld id="{750F0EE5-0DCA-4955-91ED-88EFE3E19334}" type="datetimeFigureOut">
               <a:rPr lang="de-DE" smtClean="0"/>
-              <a:t>12.10.2025</a:t>
+              <a:t>13.10.2025</a:t>
             </a:fld>
             <a:endParaRPr lang="de-DE"/>
           </a:p>
@@ -6507,495 +6507,6 @@
       </p:grpSpPr>
       <p:sp>
         <p:nvSpPr>
-          <p:cNvPr id="8" name="Textfeld 7">
-            <a:extLst>
-              <a:ext uri="{FF2B5EF4-FFF2-40B4-BE49-F238E27FC236}">
-                <a16:creationId xmlns:a16="http://schemas.microsoft.com/office/drawing/2014/main" id="{E6AB66CC-BE35-B592-7320-6DE85B60061A}"/>
-              </a:ext>
-            </a:extLst>
-          </p:cNvPr>
-          <p:cNvSpPr txBox="1"/>
-          <p:nvPr/>
-        </p:nvSpPr>
-        <p:spPr>
-          <a:xfrm>
-            <a:off x="828675" y="676275"/>
-            <a:ext cx="5029200" cy="769441"/>
-          </a:xfrm>
-          <a:prstGeom prst="rect">
-            <a:avLst/>
-          </a:prstGeom>
-          <a:noFill/>
-        </p:spPr>
-        <p:txBody>
-          <a:bodyPr wrap="square" rtlCol="0">
-            <a:spAutoFit/>
-          </a:bodyPr>
-          <a:lstStyle/>
-          <a:p>
-            <a:r>
-              <a:rPr lang="de-DE" sz="4400" dirty="0"/>
-              <a:t>Tech-Stack</a:t>
-            </a:r>
-          </a:p>
-        </p:txBody>
-      </p:sp>
-      <p:sp>
-        <p:nvSpPr>
-          <p:cNvPr id="2" name="Rechteck 1">
-            <a:extLst>
-              <a:ext uri="{FF2B5EF4-FFF2-40B4-BE49-F238E27FC236}">
-                <a16:creationId xmlns:a16="http://schemas.microsoft.com/office/drawing/2014/main" id="{E9D40D81-CBBA-326F-4C7B-8A5047F6E139}"/>
-              </a:ext>
-            </a:extLst>
-          </p:cNvPr>
-          <p:cNvSpPr/>
-          <p:nvPr/>
-        </p:nvSpPr>
-        <p:spPr>
-          <a:xfrm>
-            <a:off x="742949" y="4544793"/>
-            <a:ext cx="1352550" cy="647699"/>
-          </a:xfrm>
-          <a:prstGeom prst="rect">
-            <a:avLst/>
-          </a:prstGeom>
-          <a:solidFill>
-            <a:srgbClr val="00B0F0"/>
-          </a:solidFill>
-        </p:spPr>
-        <p:style>
-          <a:lnRef idx="2">
-            <a:schemeClr val="accent5">
-              <a:shade val="15000"/>
-            </a:schemeClr>
-          </a:lnRef>
-          <a:fillRef idx="1">
-            <a:schemeClr val="accent5"/>
-          </a:fillRef>
-          <a:effectRef idx="0">
-            <a:schemeClr val="accent5"/>
-          </a:effectRef>
-          <a:fontRef idx="minor">
-            <a:schemeClr val="lt1"/>
-          </a:fontRef>
-        </p:style>
-        <p:txBody>
-          <a:bodyPr rtlCol="0" anchor="ctr"/>
-          <a:lstStyle/>
-          <a:p>
-            <a:pPr algn="ctr"/>
-            <a:r>
-              <a:rPr lang="de-DE" sz="1600" dirty="0"/>
-              <a:t>User</a:t>
-            </a:r>
-          </a:p>
-          <a:p>
-            <a:pPr algn="ctr"/>
-            <a:r>
-              <a:rPr lang="de-DE" sz="1600" dirty="0"/>
-              <a:t>(HTML)</a:t>
-            </a:r>
-          </a:p>
-        </p:txBody>
-      </p:sp>
-      <p:sp>
-        <p:nvSpPr>
-          <p:cNvPr id="3" name="Rechteck 2">
-            <a:extLst>
-              <a:ext uri="{FF2B5EF4-FFF2-40B4-BE49-F238E27FC236}">
-                <a16:creationId xmlns:a16="http://schemas.microsoft.com/office/drawing/2014/main" id="{DA29D7F2-80B9-C559-2D67-552391EE7804}"/>
-              </a:ext>
-            </a:extLst>
-          </p:cNvPr>
-          <p:cNvSpPr/>
-          <p:nvPr/>
-        </p:nvSpPr>
-        <p:spPr>
-          <a:xfrm>
-            <a:off x="2657474" y="3227625"/>
-            <a:ext cx="7439027" cy="2169876"/>
-          </a:xfrm>
-          <a:prstGeom prst="rect">
-            <a:avLst/>
-          </a:prstGeom>
-          <a:solidFill>
-            <a:srgbClr val="00B0F0"/>
-          </a:solidFill>
-        </p:spPr>
-        <p:style>
-          <a:lnRef idx="2">
-            <a:schemeClr val="accent5">
-              <a:shade val="15000"/>
-            </a:schemeClr>
-          </a:lnRef>
-          <a:fillRef idx="1">
-            <a:schemeClr val="accent5"/>
-          </a:fillRef>
-          <a:effectRef idx="0">
-            <a:schemeClr val="accent5"/>
-          </a:effectRef>
-          <a:fontRef idx="minor">
-            <a:schemeClr val="lt1"/>
-          </a:fontRef>
-        </p:style>
-        <p:txBody>
-          <a:bodyPr rtlCol="0" anchor="t" anchorCtr="0"/>
-          <a:lstStyle/>
-          <a:p>
-            <a:r>
-              <a:rPr lang="de-DE" sz="1600" dirty="0"/>
-              <a:t>Docker</a:t>
-            </a:r>
-          </a:p>
-        </p:txBody>
-      </p:sp>
-      <p:sp>
-        <p:nvSpPr>
-          <p:cNvPr id="4" name="Rechteck 3">
-            <a:extLst>
-              <a:ext uri="{FF2B5EF4-FFF2-40B4-BE49-F238E27FC236}">
-                <a16:creationId xmlns:a16="http://schemas.microsoft.com/office/drawing/2014/main" id="{D7B7FCB1-1869-181F-FD6E-04527A21F6E3}"/>
-              </a:ext>
-            </a:extLst>
-          </p:cNvPr>
-          <p:cNvSpPr/>
-          <p:nvPr/>
-        </p:nvSpPr>
-        <p:spPr>
-          <a:xfrm>
-            <a:off x="7981949" y="4373341"/>
-            <a:ext cx="1752601" cy="819151"/>
-          </a:xfrm>
-          <a:prstGeom prst="rect">
-            <a:avLst/>
-          </a:prstGeom>
-          <a:solidFill>
-            <a:srgbClr val="00B0F0"/>
-          </a:solidFill>
-        </p:spPr>
-        <p:style>
-          <a:lnRef idx="2">
-            <a:schemeClr val="accent5">
-              <a:shade val="15000"/>
-            </a:schemeClr>
-          </a:lnRef>
-          <a:fillRef idx="1">
-            <a:schemeClr val="accent5"/>
-          </a:fillRef>
-          <a:effectRef idx="0">
-            <a:schemeClr val="accent5"/>
-          </a:effectRef>
-          <a:fontRef idx="minor">
-            <a:schemeClr val="lt1"/>
-          </a:fontRef>
-        </p:style>
-        <p:txBody>
-          <a:bodyPr rtlCol="0" anchor="ctr"/>
-          <a:lstStyle/>
-          <a:p>
-            <a:pPr algn="ctr"/>
-            <a:r>
-              <a:rPr lang="de-DE" sz="1600" dirty="0"/>
-              <a:t>Datenbank </a:t>
-            </a:r>
-            <a:br>
-              <a:rPr lang="de-DE" sz="1600" dirty="0"/>
-            </a:br>
-            <a:r>
-              <a:rPr lang="de-DE" sz="1600" dirty="0"/>
-              <a:t>(</a:t>
-            </a:r>
-            <a:r>
-              <a:rPr lang="de-DE" sz="1600" dirty="0" err="1"/>
-              <a:t>mySQL</a:t>
-            </a:r>
-            <a:r>
-              <a:rPr lang="de-DE" sz="1600" dirty="0"/>
-              <a:t>)</a:t>
-            </a:r>
-          </a:p>
-        </p:txBody>
-      </p:sp>
-      <p:sp>
-        <p:nvSpPr>
-          <p:cNvPr id="6" name="Rechteck 5">
-            <a:extLst>
-              <a:ext uri="{FF2B5EF4-FFF2-40B4-BE49-F238E27FC236}">
-                <a16:creationId xmlns:a16="http://schemas.microsoft.com/office/drawing/2014/main" id="{F179F71E-6052-9963-6A0C-A0C477CA44EA}"/>
-              </a:ext>
-            </a:extLst>
-          </p:cNvPr>
-          <p:cNvSpPr/>
-          <p:nvPr/>
-        </p:nvSpPr>
-        <p:spPr>
-          <a:xfrm>
-            <a:off x="5276849" y="4373341"/>
-            <a:ext cx="1943100" cy="800099"/>
-          </a:xfrm>
-          <a:prstGeom prst="rect">
-            <a:avLst/>
-          </a:prstGeom>
-          <a:solidFill>
-            <a:srgbClr val="00B0F0"/>
-          </a:solidFill>
-        </p:spPr>
-        <p:style>
-          <a:lnRef idx="2">
-            <a:schemeClr val="accent5">
-              <a:shade val="15000"/>
-            </a:schemeClr>
-          </a:lnRef>
-          <a:fillRef idx="1">
-            <a:schemeClr val="accent5"/>
-          </a:fillRef>
-          <a:effectRef idx="0">
-            <a:schemeClr val="accent5"/>
-          </a:effectRef>
-          <a:fontRef idx="minor">
-            <a:schemeClr val="lt1"/>
-          </a:fontRef>
-        </p:style>
-        <p:txBody>
-          <a:bodyPr rtlCol="0" anchor="ctr"/>
-          <a:lstStyle/>
-          <a:p>
-            <a:pPr algn="ctr"/>
-            <a:r>
-              <a:rPr lang="de-DE" sz="1600" dirty="0"/>
-              <a:t>Webserver </a:t>
-            </a:r>
-            <a:br>
-              <a:rPr lang="de-DE" sz="1600" dirty="0"/>
-            </a:br>
-            <a:r>
-              <a:rPr lang="de-DE" sz="1600" dirty="0"/>
-              <a:t>(Express, node.js)</a:t>
-            </a:r>
-          </a:p>
-        </p:txBody>
-      </p:sp>
-      <p:sp>
-        <p:nvSpPr>
-          <p:cNvPr id="7" name="Rechteck 6">
-            <a:extLst>
-              <a:ext uri="{FF2B5EF4-FFF2-40B4-BE49-F238E27FC236}">
-                <a16:creationId xmlns:a16="http://schemas.microsoft.com/office/drawing/2014/main" id="{E985DDE4-558A-BA88-CF29-38C94C55E53C}"/>
-              </a:ext>
-            </a:extLst>
-          </p:cNvPr>
-          <p:cNvSpPr/>
-          <p:nvPr/>
-        </p:nvSpPr>
-        <p:spPr>
-          <a:xfrm>
-            <a:off x="2945023" y="4373342"/>
-            <a:ext cx="1681794" cy="761996"/>
-          </a:xfrm>
-          <a:prstGeom prst="rect">
-            <a:avLst/>
-          </a:prstGeom>
-          <a:solidFill>
-            <a:srgbClr val="00B0F0"/>
-          </a:solidFill>
-        </p:spPr>
-        <p:style>
-          <a:lnRef idx="2">
-            <a:schemeClr val="accent5">
-              <a:shade val="15000"/>
-            </a:schemeClr>
-          </a:lnRef>
-          <a:fillRef idx="1">
-            <a:schemeClr val="accent5"/>
-          </a:fillRef>
-          <a:effectRef idx="0">
-            <a:schemeClr val="accent5"/>
-          </a:effectRef>
-          <a:fontRef idx="minor">
-            <a:schemeClr val="lt1"/>
-          </a:fontRef>
-        </p:style>
-        <p:txBody>
-          <a:bodyPr rtlCol="0" anchor="ctr"/>
-          <a:lstStyle/>
-          <a:p>
-            <a:pPr algn="ctr"/>
-            <a:r>
-              <a:rPr lang="de-DE" sz="1600" dirty="0"/>
-              <a:t>Reverse Proxy (NGINX)</a:t>
-            </a:r>
-          </a:p>
-        </p:txBody>
-      </p:sp>
-      <p:cxnSp>
-        <p:nvCxnSpPr>
-          <p:cNvPr id="13" name="Gerade Verbindung mit Pfeil 12">
-            <a:extLst>
-              <a:ext uri="{FF2B5EF4-FFF2-40B4-BE49-F238E27FC236}">
-                <a16:creationId xmlns:a16="http://schemas.microsoft.com/office/drawing/2014/main" id="{071077BC-9472-50BD-5AC8-EEAE3729CE90}"/>
-              </a:ext>
-            </a:extLst>
-          </p:cNvPr>
-          <p:cNvCxnSpPr>
-            <a:cxnSpLocks/>
-            <a:stCxn id="2" idx="3"/>
-          </p:cNvCxnSpPr>
-          <p:nvPr/>
-        </p:nvCxnSpPr>
-        <p:spPr>
-          <a:xfrm>
-            <a:off x="2095499" y="4868643"/>
-            <a:ext cx="914400" cy="0"/>
-          </a:xfrm>
-          <a:prstGeom prst="straightConnector1">
-            <a:avLst/>
-          </a:prstGeom>
-          <a:ln w="53975">
-            <a:solidFill>
-              <a:schemeClr val="tx1"/>
-            </a:solidFill>
-            <a:headEnd type="triangle"/>
-            <a:tailEnd type="triangle"/>
-          </a:ln>
-        </p:spPr>
-        <p:style>
-          <a:lnRef idx="2">
-            <a:schemeClr val="accent1"/>
-          </a:lnRef>
-          <a:fillRef idx="0">
-            <a:schemeClr val="accent1"/>
-          </a:fillRef>
-          <a:effectRef idx="1">
-            <a:schemeClr val="accent1"/>
-          </a:effectRef>
-          <a:fontRef idx="minor">
-            <a:schemeClr val="tx1"/>
-          </a:fontRef>
-        </p:style>
-      </p:cxnSp>
-      <p:cxnSp>
-        <p:nvCxnSpPr>
-          <p:cNvPr id="18" name="Gerade Verbindung mit Pfeil 17">
-            <a:extLst>
-              <a:ext uri="{FF2B5EF4-FFF2-40B4-BE49-F238E27FC236}">
-                <a16:creationId xmlns:a16="http://schemas.microsoft.com/office/drawing/2014/main" id="{016936F7-AA30-3BD4-550C-388E4E634B20}"/>
-              </a:ext>
-            </a:extLst>
-          </p:cNvPr>
-          <p:cNvCxnSpPr>
-            <a:cxnSpLocks/>
-          </p:cNvCxnSpPr>
-          <p:nvPr/>
-        </p:nvCxnSpPr>
-        <p:spPr>
-          <a:xfrm flipV="1">
-            <a:off x="7219949" y="4868638"/>
-            <a:ext cx="762000" cy="1"/>
-          </a:xfrm>
-          <a:prstGeom prst="straightConnector1">
-            <a:avLst/>
-          </a:prstGeom>
-          <a:ln w="53975">
-            <a:solidFill>
-              <a:schemeClr val="tx1"/>
-            </a:solidFill>
-            <a:headEnd type="triangle"/>
-            <a:tailEnd type="triangle"/>
-          </a:ln>
-        </p:spPr>
-        <p:style>
-          <a:lnRef idx="2">
-            <a:schemeClr val="accent1"/>
-          </a:lnRef>
-          <a:fillRef idx="0">
-            <a:schemeClr val="accent1"/>
-          </a:fillRef>
-          <a:effectRef idx="1">
-            <a:schemeClr val="accent1"/>
-          </a:effectRef>
-          <a:fontRef idx="minor">
-            <a:schemeClr val="tx1"/>
-          </a:fontRef>
-        </p:style>
-      </p:cxnSp>
-      <p:cxnSp>
-        <p:nvCxnSpPr>
-          <p:cNvPr id="5" name="Gerade Verbindung mit Pfeil 4">
-            <a:extLst>
-              <a:ext uri="{FF2B5EF4-FFF2-40B4-BE49-F238E27FC236}">
-                <a16:creationId xmlns:a16="http://schemas.microsoft.com/office/drawing/2014/main" id="{44784683-FF0D-A18C-6FAB-AA753FFC80DF}"/>
-              </a:ext>
-            </a:extLst>
-          </p:cNvPr>
-          <p:cNvCxnSpPr>
-            <a:cxnSpLocks/>
-          </p:cNvCxnSpPr>
-          <p:nvPr/>
-        </p:nvCxnSpPr>
-        <p:spPr>
-          <a:xfrm flipV="1">
-            <a:off x="4571999" y="4868638"/>
-            <a:ext cx="762000" cy="1"/>
-          </a:xfrm>
-          <a:prstGeom prst="straightConnector1">
-            <a:avLst/>
-          </a:prstGeom>
-          <a:ln w="53975">
-            <a:solidFill>
-              <a:schemeClr val="tx1"/>
-            </a:solidFill>
-            <a:headEnd type="triangle"/>
-            <a:tailEnd type="triangle"/>
-          </a:ln>
-        </p:spPr>
-        <p:style>
-          <a:lnRef idx="2">
-            <a:schemeClr val="accent1"/>
-          </a:lnRef>
-          <a:fillRef idx="0">
-            <a:schemeClr val="accent1"/>
-          </a:fillRef>
-          <a:effectRef idx="1">
-            <a:schemeClr val="accent1"/>
-          </a:effectRef>
-          <a:fontRef idx="minor">
-            <a:schemeClr val="tx1"/>
-          </a:fontRef>
-        </p:style>
-      </p:cxnSp>
-    </p:spTree>
-    <p:extLst>
-      <p:ext uri="{BB962C8B-B14F-4D97-AF65-F5344CB8AC3E}">
-        <p14:creationId xmlns:p14="http://schemas.microsoft.com/office/powerpoint/2010/main" val="1236540671"/>
-      </p:ext>
-    </p:extLst>
-  </p:cSld>
-  <p:clrMapOvr>
-    <a:masterClrMapping/>
-  </p:clrMapOvr>
-</p:sld>
-</file>
-
-<file path=ppt/slides/slide4.xml><?xml version="1.0" encoding="utf-8"?>
-<p:sld xmlns:a="http://schemas.openxmlformats.org/drawingml/2006/main" xmlns:r="http://schemas.openxmlformats.org/officeDocument/2006/relationships" xmlns:p="http://schemas.openxmlformats.org/presentationml/2006/main">
-  <p:cSld>
-    <p:spTree>
-      <p:nvGrpSpPr>
-        <p:cNvPr id="1" name=""/>
-        <p:cNvGrpSpPr/>
-        <p:nvPr/>
-      </p:nvGrpSpPr>
-      <p:grpSpPr>
-        <a:xfrm>
-          <a:off x="0" y="0"/>
-          <a:ext cx="0" cy="0"/>
-          <a:chOff x="0" y="0"/>
-          <a:chExt cx="0" cy="0"/>
-        </a:xfrm>
-      </p:grpSpPr>
-      <p:sp>
-        <p:nvSpPr>
           <p:cNvPr id="5" name="Textfeld 4">
             <a:extLst>
               <a:ext uri="{FF2B5EF4-FFF2-40B4-BE49-F238E27FC236}">
@@ -7044,14 +6555,14 @@
           <p:nvPr>
             <p:extLst>
               <p:ext uri="{D42A27DB-BD31-4B8C-83A1-F6EECF244321}">
-                <p14:modId xmlns:p14="http://schemas.microsoft.com/office/powerpoint/2010/main" val="2626653854"/>
+                <p14:modId xmlns:p14="http://schemas.microsoft.com/office/powerpoint/2010/main" val="735179189"/>
               </p:ext>
             </p:extLst>
           </p:nvPr>
         </p:nvGraphicFramePr>
         <p:xfrm>
-          <a:off x="828675" y="1521882"/>
-          <a:ext cx="10285413" cy="4820289"/>
+          <a:off x="828675" y="1445716"/>
+          <a:ext cx="10285413" cy="5351220"/>
         </p:xfrm>
         <a:graphic>
           <a:graphicData uri="http://schemas.openxmlformats.org/drawingml/2006/table">
@@ -7229,6 +6740,52 @@
                 <a:extLst>
                   <a:ext uri="{0D108BD9-81ED-4DB2-BD59-A6C34878D82A}">
                     <a16:rowId xmlns:a16="http://schemas.microsoft.com/office/drawing/2014/main" val="4144229027"/>
+                  </a:ext>
+                </a:extLst>
+              </a:tr>
+              <a:tr h="530931">
+                <a:tc>
+                  <a:txBody>
+                    <a:bodyPr/>
+                    <a:lstStyle/>
+                    <a:p>
+                      <a:r>
+                        <a:rPr lang="de-DE" sz="1200" dirty="0"/>
+                        <a:t>Admin</a:t>
+                      </a:r>
+                    </a:p>
+                  </a:txBody>
+                  <a:tcPr/>
+                </a:tc>
+                <a:tc>
+                  <a:txBody>
+                    <a:bodyPr/>
+                    <a:lstStyle/>
+                    <a:p>
+                      <a:r>
+                        <a:rPr lang="de-DE" sz="1200" dirty="0"/>
+                        <a:t>User löschen</a:t>
+                      </a:r>
+                    </a:p>
+                  </a:txBody>
+                  <a:tcPr/>
+                </a:tc>
+                <a:tc>
+                  <a:txBody>
+                    <a:bodyPr/>
+                    <a:lstStyle/>
+                    <a:p>
+                      <a:r>
+                        <a:rPr lang="de-DE" sz="1200" dirty="0"/>
+                        <a:t>Kann registrierte Benutzer löschen</a:t>
+                      </a:r>
+                    </a:p>
+                  </a:txBody>
+                  <a:tcPr/>
+                </a:tc>
+                <a:extLst>
+                  <a:ext uri="{0D108BD9-81ED-4DB2-BD59-A6C34878D82A}">
+                    <a16:rowId xmlns:a16="http://schemas.microsoft.com/office/drawing/2014/main" val="3994688529"/>
                   </a:ext>
                 </a:extLst>
               </a:tr>
@@ -7525,6 +7082,495 @@
 </p:sld>
 </file>
 
+<file path=ppt/slides/slide4.xml><?xml version="1.0" encoding="utf-8"?>
+<p:sld xmlns:a="http://schemas.openxmlformats.org/drawingml/2006/main" xmlns:r="http://schemas.openxmlformats.org/officeDocument/2006/relationships" xmlns:p="http://schemas.openxmlformats.org/presentationml/2006/main">
+  <p:cSld>
+    <p:spTree>
+      <p:nvGrpSpPr>
+        <p:cNvPr id="1" name=""/>
+        <p:cNvGrpSpPr/>
+        <p:nvPr/>
+      </p:nvGrpSpPr>
+      <p:grpSpPr>
+        <a:xfrm>
+          <a:off x="0" y="0"/>
+          <a:ext cx="0" cy="0"/>
+          <a:chOff x="0" y="0"/>
+          <a:chExt cx="0" cy="0"/>
+        </a:xfrm>
+      </p:grpSpPr>
+      <p:sp>
+        <p:nvSpPr>
+          <p:cNvPr id="8" name="Textfeld 7">
+            <a:extLst>
+              <a:ext uri="{FF2B5EF4-FFF2-40B4-BE49-F238E27FC236}">
+                <a16:creationId xmlns:a16="http://schemas.microsoft.com/office/drawing/2014/main" id="{E6AB66CC-BE35-B592-7320-6DE85B60061A}"/>
+              </a:ext>
+            </a:extLst>
+          </p:cNvPr>
+          <p:cNvSpPr txBox="1"/>
+          <p:nvPr/>
+        </p:nvSpPr>
+        <p:spPr>
+          <a:xfrm>
+            <a:off x="828675" y="676275"/>
+            <a:ext cx="5029200" cy="769441"/>
+          </a:xfrm>
+          <a:prstGeom prst="rect">
+            <a:avLst/>
+          </a:prstGeom>
+          <a:noFill/>
+        </p:spPr>
+        <p:txBody>
+          <a:bodyPr wrap="square" rtlCol="0">
+            <a:spAutoFit/>
+          </a:bodyPr>
+          <a:lstStyle/>
+          <a:p>
+            <a:r>
+              <a:rPr lang="de-DE" sz="4400" dirty="0"/>
+              <a:t>Tech-Stack</a:t>
+            </a:r>
+          </a:p>
+        </p:txBody>
+      </p:sp>
+      <p:sp>
+        <p:nvSpPr>
+          <p:cNvPr id="2" name="Rechteck 1">
+            <a:extLst>
+              <a:ext uri="{FF2B5EF4-FFF2-40B4-BE49-F238E27FC236}">
+                <a16:creationId xmlns:a16="http://schemas.microsoft.com/office/drawing/2014/main" id="{E9D40D81-CBBA-326F-4C7B-8A5047F6E139}"/>
+              </a:ext>
+            </a:extLst>
+          </p:cNvPr>
+          <p:cNvSpPr/>
+          <p:nvPr/>
+        </p:nvSpPr>
+        <p:spPr>
+          <a:xfrm>
+            <a:off x="742949" y="4544793"/>
+            <a:ext cx="1352550" cy="647699"/>
+          </a:xfrm>
+          <a:prstGeom prst="rect">
+            <a:avLst/>
+          </a:prstGeom>
+          <a:solidFill>
+            <a:srgbClr val="00B0F0"/>
+          </a:solidFill>
+        </p:spPr>
+        <p:style>
+          <a:lnRef idx="2">
+            <a:schemeClr val="accent5">
+              <a:shade val="15000"/>
+            </a:schemeClr>
+          </a:lnRef>
+          <a:fillRef idx="1">
+            <a:schemeClr val="accent5"/>
+          </a:fillRef>
+          <a:effectRef idx="0">
+            <a:schemeClr val="accent5"/>
+          </a:effectRef>
+          <a:fontRef idx="minor">
+            <a:schemeClr val="lt1"/>
+          </a:fontRef>
+        </p:style>
+        <p:txBody>
+          <a:bodyPr rtlCol="0" anchor="ctr"/>
+          <a:lstStyle/>
+          <a:p>
+            <a:pPr algn="ctr"/>
+            <a:r>
+              <a:rPr lang="de-DE" sz="1600" dirty="0"/>
+              <a:t>User</a:t>
+            </a:r>
+          </a:p>
+          <a:p>
+            <a:pPr algn="ctr"/>
+            <a:r>
+              <a:rPr lang="de-DE" sz="1600" dirty="0"/>
+              <a:t>(HTML)</a:t>
+            </a:r>
+          </a:p>
+        </p:txBody>
+      </p:sp>
+      <p:sp>
+        <p:nvSpPr>
+          <p:cNvPr id="3" name="Rechteck 2">
+            <a:extLst>
+              <a:ext uri="{FF2B5EF4-FFF2-40B4-BE49-F238E27FC236}">
+                <a16:creationId xmlns:a16="http://schemas.microsoft.com/office/drawing/2014/main" id="{DA29D7F2-80B9-C559-2D67-552391EE7804}"/>
+              </a:ext>
+            </a:extLst>
+          </p:cNvPr>
+          <p:cNvSpPr/>
+          <p:nvPr/>
+        </p:nvSpPr>
+        <p:spPr>
+          <a:xfrm>
+            <a:off x="2657474" y="3227625"/>
+            <a:ext cx="7439027" cy="2169876"/>
+          </a:xfrm>
+          <a:prstGeom prst="rect">
+            <a:avLst/>
+          </a:prstGeom>
+          <a:solidFill>
+            <a:srgbClr val="00B0F0"/>
+          </a:solidFill>
+        </p:spPr>
+        <p:style>
+          <a:lnRef idx="2">
+            <a:schemeClr val="accent5">
+              <a:shade val="15000"/>
+            </a:schemeClr>
+          </a:lnRef>
+          <a:fillRef idx="1">
+            <a:schemeClr val="accent5"/>
+          </a:fillRef>
+          <a:effectRef idx="0">
+            <a:schemeClr val="accent5"/>
+          </a:effectRef>
+          <a:fontRef idx="minor">
+            <a:schemeClr val="lt1"/>
+          </a:fontRef>
+        </p:style>
+        <p:txBody>
+          <a:bodyPr rtlCol="0" anchor="t" anchorCtr="0"/>
+          <a:lstStyle/>
+          <a:p>
+            <a:r>
+              <a:rPr lang="de-DE" sz="1600" dirty="0"/>
+              <a:t>Docker</a:t>
+            </a:r>
+          </a:p>
+        </p:txBody>
+      </p:sp>
+      <p:sp>
+        <p:nvSpPr>
+          <p:cNvPr id="4" name="Rechteck 3">
+            <a:extLst>
+              <a:ext uri="{FF2B5EF4-FFF2-40B4-BE49-F238E27FC236}">
+                <a16:creationId xmlns:a16="http://schemas.microsoft.com/office/drawing/2014/main" id="{D7B7FCB1-1869-181F-FD6E-04527A21F6E3}"/>
+              </a:ext>
+            </a:extLst>
+          </p:cNvPr>
+          <p:cNvSpPr/>
+          <p:nvPr/>
+        </p:nvSpPr>
+        <p:spPr>
+          <a:xfrm>
+            <a:off x="7981949" y="4373341"/>
+            <a:ext cx="1752601" cy="819151"/>
+          </a:xfrm>
+          <a:prstGeom prst="rect">
+            <a:avLst/>
+          </a:prstGeom>
+          <a:solidFill>
+            <a:srgbClr val="00B0F0"/>
+          </a:solidFill>
+        </p:spPr>
+        <p:style>
+          <a:lnRef idx="2">
+            <a:schemeClr val="accent5">
+              <a:shade val="15000"/>
+            </a:schemeClr>
+          </a:lnRef>
+          <a:fillRef idx="1">
+            <a:schemeClr val="accent5"/>
+          </a:fillRef>
+          <a:effectRef idx="0">
+            <a:schemeClr val="accent5"/>
+          </a:effectRef>
+          <a:fontRef idx="minor">
+            <a:schemeClr val="lt1"/>
+          </a:fontRef>
+        </p:style>
+        <p:txBody>
+          <a:bodyPr rtlCol="0" anchor="ctr"/>
+          <a:lstStyle/>
+          <a:p>
+            <a:pPr algn="ctr"/>
+            <a:r>
+              <a:rPr lang="de-DE" sz="1600" dirty="0"/>
+              <a:t>Datenbank </a:t>
+            </a:r>
+            <a:br>
+              <a:rPr lang="de-DE" sz="1600" dirty="0"/>
+            </a:br>
+            <a:r>
+              <a:rPr lang="de-DE" sz="1600" dirty="0"/>
+              <a:t>(</a:t>
+            </a:r>
+            <a:r>
+              <a:rPr lang="de-DE" sz="1600" dirty="0" err="1"/>
+              <a:t>mySQL</a:t>
+            </a:r>
+            <a:r>
+              <a:rPr lang="de-DE" sz="1600" dirty="0"/>
+              <a:t>)</a:t>
+            </a:r>
+          </a:p>
+        </p:txBody>
+      </p:sp>
+      <p:sp>
+        <p:nvSpPr>
+          <p:cNvPr id="6" name="Rechteck 5">
+            <a:extLst>
+              <a:ext uri="{FF2B5EF4-FFF2-40B4-BE49-F238E27FC236}">
+                <a16:creationId xmlns:a16="http://schemas.microsoft.com/office/drawing/2014/main" id="{F179F71E-6052-9963-6A0C-A0C477CA44EA}"/>
+              </a:ext>
+            </a:extLst>
+          </p:cNvPr>
+          <p:cNvSpPr/>
+          <p:nvPr/>
+        </p:nvSpPr>
+        <p:spPr>
+          <a:xfrm>
+            <a:off x="5276849" y="4373341"/>
+            <a:ext cx="1943100" cy="800099"/>
+          </a:xfrm>
+          <a:prstGeom prst="rect">
+            <a:avLst/>
+          </a:prstGeom>
+          <a:solidFill>
+            <a:srgbClr val="00B0F0"/>
+          </a:solidFill>
+        </p:spPr>
+        <p:style>
+          <a:lnRef idx="2">
+            <a:schemeClr val="accent5">
+              <a:shade val="15000"/>
+            </a:schemeClr>
+          </a:lnRef>
+          <a:fillRef idx="1">
+            <a:schemeClr val="accent5"/>
+          </a:fillRef>
+          <a:effectRef idx="0">
+            <a:schemeClr val="accent5"/>
+          </a:effectRef>
+          <a:fontRef idx="minor">
+            <a:schemeClr val="lt1"/>
+          </a:fontRef>
+        </p:style>
+        <p:txBody>
+          <a:bodyPr rtlCol="0" anchor="ctr"/>
+          <a:lstStyle/>
+          <a:p>
+            <a:pPr algn="ctr"/>
+            <a:r>
+              <a:rPr lang="de-DE" sz="1600" dirty="0"/>
+              <a:t>Webserver </a:t>
+            </a:r>
+            <a:br>
+              <a:rPr lang="de-DE" sz="1600" dirty="0"/>
+            </a:br>
+            <a:r>
+              <a:rPr lang="de-DE" sz="1600" dirty="0"/>
+              <a:t>(Express, node.js)</a:t>
+            </a:r>
+          </a:p>
+        </p:txBody>
+      </p:sp>
+      <p:sp>
+        <p:nvSpPr>
+          <p:cNvPr id="7" name="Rechteck 6">
+            <a:extLst>
+              <a:ext uri="{FF2B5EF4-FFF2-40B4-BE49-F238E27FC236}">
+                <a16:creationId xmlns:a16="http://schemas.microsoft.com/office/drawing/2014/main" id="{E985DDE4-558A-BA88-CF29-38C94C55E53C}"/>
+              </a:ext>
+            </a:extLst>
+          </p:cNvPr>
+          <p:cNvSpPr/>
+          <p:nvPr/>
+        </p:nvSpPr>
+        <p:spPr>
+          <a:xfrm>
+            <a:off x="2945023" y="4373342"/>
+            <a:ext cx="1681794" cy="761996"/>
+          </a:xfrm>
+          <a:prstGeom prst="rect">
+            <a:avLst/>
+          </a:prstGeom>
+          <a:solidFill>
+            <a:srgbClr val="00B0F0"/>
+          </a:solidFill>
+        </p:spPr>
+        <p:style>
+          <a:lnRef idx="2">
+            <a:schemeClr val="accent5">
+              <a:shade val="15000"/>
+            </a:schemeClr>
+          </a:lnRef>
+          <a:fillRef idx="1">
+            <a:schemeClr val="accent5"/>
+          </a:fillRef>
+          <a:effectRef idx="0">
+            <a:schemeClr val="accent5"/>
+          </a:effectRef>
+          <a:fontRef idx="minor">
+            <a:schemeClr val="lt1"/>
+          </a:fontRef>
+        </p:style>
+        <p:txBody>
+          <a:bodyPr rtlCol="0" anchor="ctr"/>
+          <a:lstStyle/>
+          <a:p>
+            <a:pPr algn="ctr"/>
+            <a:r>
+              <a:rPr lang="de-DE" sz="1600" dirty="0"/>
+              <a:t>Reverse Proxy (NGINX)</a:t>
+            </a:r>
+          </a:p>
+        </p:txBody>
+      </p:sp>
+      <p:cxnSp>
+        <p:nvCxnSpPr>
+          <p:cNvPr id="13" name="Gerade Verbindung mit Pfeil 12">
+            <a:extLst>
+              <a:ext uri="{FF2B5EF4-FFF2-40B4-BE49-F238E27FC236}">
+                <a16:creationId xmlns:a16="http://schemas.microsoft.com/office/drawing/2014/main" id="{071077BC-9472-50BD-5AC8-EEAE3729CE90}"/>
+              </a:ext>
+            </a:extLst>
+          </p:cNvPr>
+          <p:cNvCxnSpPr>
+            <a:cxnSpLocks/>
+            <a:stCxn id="2" idx="3"/>
+          </p:cNvCxnSpPr>
+          <p:nvPr/>
+        </p:nvCxnSpPr>
+        <p:spPr>
+          <a:xfrm>
+            <a:off x="2095499" y="4868643"/>
+            <a:ext cx="914400" cy="0"/>
+          </a:xfrm>
+          <a:prstGeom prst="straightConnector1">
+            <a:avLst/>
+          </a:prstGeom>
+          <a:ln w="53975">
+            <a:solidFill>
+              <a:schemeClr val="tx1"/>
+            </a:solidFill>
+            <a:headEnd type="triangle"/>
+            <a:tailEnd type="triangle"/>
+          </a:ln>
+        </p:spPr>
+        <p:style>
+          <a:lnRef idx="2">
+            <a:schemeClr val="accent1"/>
+          </a:lnRef>
+          <a:fillRef idx="0">
+            <a:schemeClr val="accent1"/>
+          </a:fillRef>
+          <a:effectRef idx="1">
+            <a:schemeClr val="accent1"/>
+          </a:effectRef>
+          <a:fontRef idx="minor">
+            <a:schemeClr val="tx1"/>
+          </a:fontRef>
+        </p:style>
+      </p:cxnSp>
+      <p:cxnSp>
+        <p:nvCxnSpPr>
+          <p:cNvPr id="18" name="Gerade Verbindung mit Pfeil 17">
+            <a:extLst>
+              <a:ext uri="{FF2B5EF4-FFF2-40B4-BE49-F238E27FC236}">
+                <a16:creationId xmlns:a16="http://schemas.microsoft.com/office/drawing/2014/main" id="{016936F7-AA30-3BD4-550C-388E4E634B20}"/>
+              </a:ext>
+            </a:extLst>
+          </p:cNvPr>
+          <p:cNvCxnSpPr>
+            <a:cxnSpLocks/>
+          </p:cNvCxnSpPr>
+          <p:nvPr/>
+        </p:nvCxnSpPr>
+        <p:spPr>
+          <a:xfrm flipV="1">
+            <a:off x="7219949" y="4868638"/>
+            <a:ext cx="762000" cy="1"/>
+          </a:xfrm>
+          <a:prstGeom prst="straightConnector1">
+            <a:avLst/>
+          </a:prstGeom>
+          <a:ln w="53975">
+            <a:solidFill>
+              <a:schemeClr val="tx1"/>
+            </a:solidFill>
+            <a:headEnd type="triangle"/>
+            <a:tailEnd type="triangle"/>
+          </a:ln>
+        </p:spPr>
+        <p:style>
+          <a:lnRef idx="2">
+            <a:schemeClr val="accent1"/>
+          </a:lnRef>
+          <a:fillRef idx="0">
+            <a:schemeClr val="accent1"/>
+          </a:fillRef>
+          <a:effectRef idx="1">
+            <a:schemeClr val="accent1"/>
+          </a:effectRef>
+          <a:fontRef idx="minor">
+            <a:schemeClr val="tx1"/>
+          </a:fontRef>
+        </p:style>
+      </p:cxnSp>
+      <p:cxnSp>
+        <p:nvCxnSpPr>
+          <p:cNvPr id="5" name="Gerade Verbindung mit Pfeil 4">
+            <a:extLst>
+              <a:ext uri="{FF2B5EF4-FFF2-40B4-BE49-F238E27FC236}">
+                <a16:creationId xmlns:a16="http://schemas.microsoft.com/office/drawing/2014/main" id="{44784683-FF0D-A18C-6FAB-AA753FFC80DF}"/>
+              </a:ext>
+            </a:extLst>
+          </p:cNvPr>
+          <p:cNvCxnSpPr>
+            <a:cxnSpLocks/>
+          </p:cNvCxnSpPr>
+          <p:nvPr/>
+        </p:nvCxnSpPr>
+        <p:spPr>
+          <a:xfrm flipV="1">
+            <a:off x="4571999" y="4868638"/>
+            <a:ext cx="762000" cy="1"/>
+          </a:xfrm>
+          <a:prstGeom prst="straightConnector1">
+            <a:avLst/>
+          </a:prstGeom>
+          <a:ln w="53975">
+            <a:solidFill>
+              <a:schemeClr val="tx1"/>
+            </a:solidFill>
+            <a:headEnd type="triangle"/>
+            <a:tailEnd type="triangle"/>
+          </a:ln>
+        </p:spPr>
+        <p:style>
+          <a:lnRef idx="2">
+            <a:schemeClr val="accent1"/>
+          </a:lnRef>
+          <a:fillRef idx="0">
+            <a:schemeClr val="accent1"/>
+          </a:fillRef>
+          <a:effectRef idx="1">
+            <a:schemeClr val="accent1"/>
+          </a:effectRef>
+          <a:fontRef idx="minor">
+            <a:schemeClr val="tx1"/>
+          </a:fontRef>
+        </p:style>
+      </p:cxnSp>
+    </p:spTree>
+    <p:extLst>
+      <p:ext uri="{BB962C8B-B14F-4D97-AF65-F5344CB8AC3E}">
+        <p14:creationId xmlns:p14="http://schemas.microsoft.com/office/powerpoint/2010/main" val="1236540671"/>
+      </p:ext>
+    </p:extLst>
+  </p:cSld>
+  <p:clrMapOvr>
+    <a:masterClrMapping/>
+  </p:clrMapOvr>
+</p:sld>
+</file>
+
 <file path=ppt/slides/slide5.xml><?xml version="1.0" encoding="utf-8"?>
 <p:sld xmlns:a="http://schemas.openxmlformats.org/drawingml/2006/main" xmlns:r="http://schemas.openxmlformats.org/officeDocument/2006/relationships" xmlns:p="http://schemas.openxmlformats.org/presentationml/2006/main">
   <p:cSld>
@@ -8433,6 +8479,57 @@
               <a:rPr lang="de-DE" sz="1400" dirty="0"/>
               <a:t>Anmeldung als User</a:t>
             </a:r>
+          </a:p>
+        </p:txBody>
+      </p:sp>
+      <p:sp>
+        <p:nvSpPr>
+          <p:cNvPr id="3" name="Textfeld 2">
+            <a:extLst>
+              <a:ext uri="{FF2B5EF4-FFF2-40B4-BE49-F238E27FC236}">
+                <a16:creationId xmlns:a16="http://schemas.microsoft.com/office/drawing/2014/main" id="{1DD213DF-39B7-24E1-7DAF-0FF1702EFB6C}"/>
+              </a:ext>
+            </a:extLst>
+          </p:cNvPr>
+          <p:cNvSpPr txBox="1"/>
+          <p:nvPr/>
+        </p:nvSpPr>
+        <p:spPr>
+          <a:xfrm>
+            <a:off x="954287" y="5762625"/>
+            <a:ext cx="10496550" cy="307777"/>
+          </a:xfrm>
+          <a:prstGeom prst="rect">
+            <a:avLst/>
+          </a:prstGeom>
+          <a:noFill/>
+        </p:spPr>
+        <p:txBody>
+          <a:bodyPr wrap="square" rtlCol="0">
+            <a:spAutoFit/>
+          </a:bodyPr>
+          <a:lstStyle/>
+          <a:p>
+            <a:r>
+              <a:rPr lang="de-DE" sz="1400" dirty="0">
+                <a:solidFill>
+                  <a:srgbClr val="FF0000"/>
+                </a:solidFill>
+                <a:hlinkClick r:id="rId2" action="ppaction://hlinkfile">
+                  <a:extLst>
+                    <a:ext uri="{A12FA001-AC4F-418D-AE19-62706E023703}">
+                      <ahyp:hlinkClr xmlns:ahyp="http://schemas.microsoft.com/office/drawing/2018/hyperlinkcolor" val="tx"/>
+                    </a:ext>
+                  </a:extLst>
+                </a:hlinkClick>
+              </a:rPr>
+              <a:t>Link zu Detail Mock-UP</a:t>
+            </a:r>
+            <a:endParaRPr lang="de-DE" sz="1400" dirty="0">
+              <a:solidFill>
+                <a:srgbClr val="FF0000"/>
+              </a:solidFill>
+            </a:endParaRPr>
           </a:p>
         </p:txBody>
       </p:sp>

</xml_diff>